<commit_message>
Going to spatial join the count data
pqwertyuiop[]\12Zxcvbnm,./
</commit_message>
<xml_diff>
--- a/doc/pre_results.pptx
+++ b/doc/pre_results.pptx
@@ -125,6 +125,60 @@
 </p:presentation>
 </file>
 
+<file path=ppt/commentAuthors.xml><?xml version="1.0" encoding="utf-8"?>
+<p:cmAuthorLst xmlns:a="http://schemas.openxmlformats.org/drawingml/2006/main" xmlns:r="http://schemas.openxmlformats.org/officeDocument/2006/relationships" xmlns:p="http://schemas.openxmlformats.org/presentationml/2006/main">
+  <p:cmAuthor id="1" name="Miller, Harvey J." initials="MHJ" lastIdx="4" clrIdx="0">
+    <p:extLst>
+      <p:ext uri="{19B8F6BF-5375-455C-9EA6-DF929625EA0E}">
+        <p15:presenceInfo xmlns:p15="http://schemas.microsoft.com/office/powerpoint/2012/main" userId="S-1-5-21-3711032425-755364728-2729317452-19340" providerId="AD"/>
+      </p:ext>
+    </p:extLst>
+  </p:cmAuthor>
+</p:cmAuthorLst>
+</file>
+
+<file path=ppt/comments/comment1.xml><?xml version="1.0" encoding="utf-8"?>
+<p:cmLst xmlns:a="http://schemas.openxmlformats.org/drawingml/2006/main" xmlns:r="http://schemas.openxmlformats.org/officeDocument/2006/relationships" xmlns:p="http://schemas.openxmlformats.org/presentationml/2006/main">
+  <p:cm authorId="1" dt="2020-04-08T13:44:48.475" idx="1">
+    <p:pos x="5838" y="998"/>
+    <p:text>Need to label x and y axis.</p:text>
+    <p:extLst>
+      <p:ext uri="{C676402C-5697-4E1C-873F-D02D1690AC5C}">
+        <p15:threadingInfo xmlns:p15="http://schemas.microsoft.com/office/powerpoint/2012/main" timeZoneBias="240"/>
+      </p:ext>
+    </p:extLst>
+  </p:cm>
+</p:cmLst>
+</file>
+
+<file path=ppt/comments/comment2.xml><?xml version="1.0" encoding="utf-8"?>
+<p:cmLst xmlns:a="http://schemas.openxmlformats.org/drawingml/2006/main" xmlns:r="http://schemas.openxmlformats.org/officeDocument/2006/relationships" xmlns:p="http://schemas.openxmlformats.org/presentationml/2006/main">
+  <p:cm authorId="1" dt="2020-04-08T13:46:37.872" idx="2">
+    <p:pos x="3928" y="1172"/>
+    <p:text>label the x and y axis</p:text>
+    <p:extLst>
+      <p:ext uri="{C676402C-5697-4E1C-873F-D02D1690AC5C}">
+        <p15:threadingInfo xmlns:p15="http://schemas.microsoft.com/office/powerpoint/2012/main" timeZoneBias="240"/>
+      </p:ext>
+    </p:extLst>
+  </p:cm>
+</p:cmLst>
+</file>
+
+<file path=ppt/comments/comment3.xml><?xml version="1.0" encoding="utf-8"?>
+<p:cmLst xmlns:a="http://schemas.openxmlformats.org/drawingml/2006/main" xmlns:r="http://schemas.openxmlformats.org/officeDocument/2006/relationships" xmlns:p="http://schemas.openxmlformats.org/presentationml/2006/main">
+  <p:cm authorId="1" dt="2020-04-08T14:08:02.627" idx="4">
+    <p:pos x="3758" y="1181"/>
+    <p:text>List some more, in rank order (highest to lowest)</p:text>
+    <p:extLst>
+      <p:ext uri="{C676402C-5697-4E1C-873F-D02D1690AC5C}">
+        <p15:threadingInfo xmlns:p15="http://schemas.microsoft.com/office/powerpoint/2012/main" timeZoneBias="240"/>
+      </p:ext>
+    </p:extLst>
+  </p:cm>
+</p:cmLst>
+</file>
+
 <file path=ppt/slideLayouts/slideLayout1.xml><?xml version="1.0" encoding="utf-8"?>
 <p:sldLayout xmlns:a="http://schemas.openxmlformats.org/drawingml/2006/main" xmlns:r="http://schemas.openxmlformats.org/officeDocument/2006/relationships" xmlns:p="http://schemas.openxmlformats.org/presentationml/2006/main" type="title" preserve="1">
   <p:cSld name="Title Slide">
@@ -254,7 +308,7 @@
           <a:p>
             <a:fld id="{F24761F3-EBE3-47CA-9C15-B1B8E3A6DAF7}" type="datetimeFigureOut">
               <a:rPr lang="en-US" smtClean="0"/>
-              <a:t>4/6/2020</a:t>
+              <a:t>4/8/2020</a:t>
             </a:fld>
             <a:endParaRPr lang="en-US"/>
           </a:p>
@@ -422,7 +476,7 @@
           <a:p>
             <a:fld id="{F24761F3-EBE3-47CA-9C15-B1B8E3A6DAF7}" type="datetimeFigureOut">
               <a:rPr lang="en-US" smtClean="0"/>
-              <a:t>4/6/2020</a:t>
+              <a:t>4/8/2020</a:t>
             </a:fld>
             <a:endParaRPr lang="en-US"/>
           </a:p>
@@ -600,7 +654,7 @@
           <a:p>
             <a:fld id="{F24761F3-EBE3-47CA-9C15-B1B8E3A6DAF7}" type="datetimeFigureOut">
               <a:rPr lang="en-US" smtClean="0"/>
-              <a:t>4/6/2020</a:t>
+              <a:t>4/8/2020</a:t>
             </a:fld>
             <a:endParaRPr lang="en-US"/>
           </a:p>
@@ -768,7 +822,7 @@
           <a:p>
             <a:fld id="{F24761F3-EBE3-47CA-9C15-B1B8E3A6DAF7}" type="datetimeFigureOut">
               <a:rPr lang="en-US" smtClean="0"/>
-              <a:t>4/6/2020</a:t>
+              <a:t>4/8/2020</a:t>
             </a:fld>
             <a:endParaRPr lang="en-US"/>
           </a:p>
@@ -1013,7 +1067,7 @@
           <a:p>
             <a:fld id="{F24761F3-EBE3-47CA-9C15-B1B8E3A6DAF7}" type="datetimeFigureOut">
               <a:rPr lang="en-US" smtClean="0"/>
-              <a:t>4/6/2020</a:t>
+              <a:t>4/8/2020</a:t>
             </a:fld>
             <a:endParaRPr lang="en-US"/>
           </a:p>
@@ -1242,7 +1296,7 @@
           <a:p>
             <a:fld id="{F24761F3-EBE3-47CA-9C15-B1B8E3A6DAF7}" type="datetimeFigureOut">
               <a:rPr lang="en-US" smtClean="0"/>
-              <a:t>4/6/2020</a:t>
+              <a:t>4/8/2020</a:t>
             </a:fld>
             <a:endParaRPr lang="en-US"/>
           </a:p>
@@ -1606,7 +1660,7 @@
           <a:p>
             <a:fld id="{F24761F3-EBE3-47CA-9C15-B1B8E3A6DAF7}" type="datetimeFigureOut">
               <a:rPr lang="en-US" smtClean="0"/>
-              <a:t>4/6/2020</a:t>
+              <a:t>4/8/2020</a:t>
             </a:fld>
             <a:endParaRPr lang="en-US"/>
           </a:p>
@@ -1723,7 +1777,7 @@
           <a:p>
             <a:fld id="{F24761F3-EBE3-47CA-9C15-B1B8E3A6DAF7}" type="datetimeFigureOut">
               <a:rPr lang="en-US" smtClean="0"/>
-              <a:t>4/6/2020</a:t>
+              <a:t>4/8/2020</a:t>
             </a:fld>
             <a:endParaRPr lang="en-US"/>
           </a:p>
@@ -1818,7 +1872,7 @@
           <a:p>
             <a:fld id="{F24761F3-EBE3-47CA-9C15-B1B8E3A6DAF7}" type="datetimeFigureOut">
               <a:rPr lang="en-US" smtClean="0"/>
-              <a:t>4/6/2020</a:t>
+              <a:t>4/8/2020</a:t>
             </a:fld>
             <a:endParaRPr lang="en-US"/>
           </a:p>
@@ -2093,7 +2147,7 @@
           <a:p>
             <a:fld id="{F24761F3-EBE3-47CA-9C15-B1B8E3A6DAF7}" type="datetimeFigureOut">
               <a:rPr lang="en-US" smtClean="0"/>
-              <a:t>4/6/2020</a:t>
+              <a:t>4/8/2020</a:t>
             </a:fld>
             <a:endParaRPr lang="en-US"/>
           </a:p>
@@ -2345,7 +2399,7 @@
           <a:p>
             <a:fld id="{F24761F3-EBE3-47CA-9C15-B1B8E3A6DAF7}" type="datetimeFigureOut">
               <a:rPr lang="en-US" smtClean="0"/>
-              <a:t>4/6/2020</a:t>
+              <a:t>4/8/2020</a:t>
             </a:fld>
             <a:endParaRPr lang="en-US"/>
           </a:p>
@@ -2556,7 +2610,7 @@
           <a:p>
             <a:fld id="{F24761F3-EBE3-47CA-9C15-B1B8E3A6DAF7}" type="datetimeFigureOut">
               <a:rPr lang="en-US" smtClean="0"/>
-              <a:t>4/6/2020</a:t>
+              <a:t>4/8/2020</a:t>
             </a:fld>
             <a:endParaRPr lang="en-US"/>
           </a:p>
@@ -2971,7 +3025,12 @@
             <p:ph type="ctrTitle"/>
           </p:nvPr>
         </p:nvSpPr>
-        <p:spPr/>
+        <p:spPr>
+          <a:xfrm>
+            <a:off x="1524000" y="814632"/>
+            <a:ext cx="9144000" cy="2387600"/>
+          </a:xfrm>
+        </p:spPr>
         <p:txBody>
           <a:bodyPr>
             <a:normAutofit/>
@@ -2980,8 +3039,21 @@
           <a:p>
             <a:r>
               <a:rPr lang="en-US" sz="4400" dirty="0"/>
-              <a:t>Measuring the impact of COVID-19 on the Ridership in the US transit systems</a:t>
-            </a:r>
+              <a:t>Measuring the </a:t>
+            </a:r>
+            <a:r>
+              <a:rPr lang="en-US" sz="4400" dirty="0" smtClean="0"/>
+              <a:t>Impact </a:t>
+            </a:r>
+            <a:r>
+              <a:rPr lang="en-US" sz="4400" dirty="0"/>
+              <a:t>of COVID-19 on the Ridership in the US </a:t>
+            </a:r>
+            <a:r>
+              <a:rPr lang="en-US" sz="4400" dirty="0" smtClean="0"/>
+              <a:t>Transit Systems</a:t>
+            </a:r>
+            <a:endParaRPr lang="en-US" sz="4400" dirty="0"/>
           </a:p>
         </p:txBody>
       </p:sp>
@@ -2995,10 +3067,15 @@
             <p:ph type="subTitle" idx="1"/>
           </p:nvPr>
         </p:nvSpPr>
-        <p:spPr/>
+        <p:spPr>
+          <a:xfrm>
+            <a:off x="1524000" y="3602037"/>
+            <a:ext cx="9144000" cy="3053739"/>
+          </a:xfrm>
+        </p:spPr>
         <p:txBody>
           <a:bodyPr>
-            <a:normAutofit fontScale="92500" lnSpcReduction="10000"/>
+            <a:normAutofit lnSpcReduction="10000"/>
           </a:bodyPr>
           <a:lstStyle/>
           <a:p>
@@ -3020,6 +3097,18 @@
             <a:r>
               <a:rPr lang="en-US" dirty="0" smtClean="0"/>
               <a:t>Center for Urban and Regional Analysis</a:t>
+            </a:r>
+          </a:p>
+          <a:p>
+            <a:endParaRPr lang="en-US" dirty="0"/>
+          </a:p>
+          <a:p>
+            <a:endParaRPr lang="en-US" dirty="0" smtClean="0"/>
+          </a:p>
+          <a:p>
+            <a:r>
+              <a:rPr lang="en-US" dirty="0" smtClean="0"/>
+              <a:t>{liu.6544, miller.81}@osu.edu</a:t>
             </a:r>
             <a:endParaRPr lang="en-US" dirty="0"/>
           </a:p>
@@ -3098,386 +3187,72 @@
             </a:r>
           </a:p>
           <a:p>
+            <a:r>
+              <a:rPr lang="en-US" dirty="0" smtClean="0"/>
+              <a:t>Need raw app activities data for the aggregation.</a:t>
+            </a:r>
+            <a:endParaRPr lang="en-US" dirty="0"/>
+          </a:p>
+          <a:p>
             <a:endParaRPr lang="en-US" dirty="0" smtClean="0"/>
           </a:p>
           <a:p>
+            <a:endParaRPr lang="en-US" dirty="0"/>
+          </a:p>
+          <a:p>
+            <a:pPr marL="0" indent="0">
+              <a:buNone/>
+            </a:pPr>
+            <a:endParaRPr lang="en-US" dirty="0"/>
+          </a:p>
+          <a:p>
+            <a:pPr marL="0" indent="0">
+              <a:buNone/>
+            </a:pPr>
+            <a:r>
+              <a:rPr lang="en-US" b="1" dirty="0" smtClean="0"/>
+              <a:t>Request</a:t>
+            </a:r>
             <a:r>
               <a:rPr lang="en-US" dirty="0" smtClean="0"/>
-              <a:t>If raw data is sensitive, we can also work with normalized/adjusted value. </a:t>
-            </a:r>
-          </a:p>
-          <a:p>
-            <a:endParaRPr lang="en-US" dirty="0"/>
-          </a:p>
-          <a:p>
+              <a:t>: raw app activities/demand data for </a:t>
+            </a:r>
+            <a:r>
+              <a:rPr lang="en-US" i="1" dirty="0" smtClean="0"/>
+              <a:t>daily data</a:t>
+            </a:r>
             <a:r>
               <a:rPr lang="en-US" dirty="0" smtClean="0"/>
-              <a:t>For example, the percentage version of </a:t>
-            </a:r>
-            <a:r>
-              <a:rPr lang="en-US" dirty="0" err="1" smtClean="0"/>
-              <a:t>everyday’s</a:t>
+              <a:t> and </a:t>
+            </a:r>
+            <a:r>
+              <a:rPr lang="en-US" i="1" dirty="0" smtClean="0"/>
+              <a:t>hourly data</a:t>
+            </a:r>
+            <a:r>
+              <a:rPr lang="en-US" dirty="0"/>
+              <a:t> </a:t>
             </a:r>
             <a:r>
               <a:rPr lang="en-US" dirty="0" smtClean="0"/>
-              <a:t> demand based on the highest day.</a:t>
-            </a:r>
-            <a:endParaRPr lang="en-US" dirty="0"/>
+              <a:t>from at least 2/15/2020 to present.</a:t>
+            </a:r>
           </a:p>
           <a:p>
             <a:pPr marL="0" indent="0">
               <a:buNone/>
             </a:pPr>
-            <a:endParaRPr lang="en-US" dirty="0" smtClean="0"/>
-          </a:p>
-        </p:txBody>
-      </p:sp>
-      <p:graphicFrame>
-        <p:nvGraphicFramePr>
-          <p:cNvPr id="4" name="Table 3"/>
-          <p:cNvGraphicFramePr>
-            <a:graphicFrameLocks noGrp="1"/>
-          </p:cNvGraphicFramePr>
-          <p:nvPr>
-            <p:extLst>
-              <p:ext uri="{D42A27DB-BD31-4B8C-83A1-F6EECF244321}">
-                <p14:modId xmlns:p14="http://schemas.microsoft.com/office/powerpoint/2010/main" val="3001162024"/>
-              </p:ext>
-            </p:extLst>
-          </p:nvPr>
-        </p:nvGraphicFramePr>
-        <p:xfrm>
-          <a:off x="1951891" y="5133405"/>
-          <a:ext cx="8762025" cy="1651000"/>
-        </p:xfrm>
-        <a:graphic>
-          <a:graphicData uri="http://schemas.openxmlformats.org/drawingml/2006/table">
-            <a:tbl>
-              <a:tblPr firstRow="1" bandRow="1">
-                <a:tableStyleId>{5C22544A-7EE6-4342-B048-85BDC9FD1C3A}</a:tableStyleId>
-              </a:tblPr>
-              <a:tblGrid>
-                <a:gridCol w="1752405">
-                  <a:extLst>
-                    <a:ext uri="{9D8B030D-6E8A-4147-A177-3AD203B41FA5}">
-                      <a16:colId xmlns:a16="http://schemas.microsoft.com/office/drawing/2014/main" val="2961592509"/>
-                    </a:ext>
-                  </a:extLst>
-                </a:gridCol>
-                <a:gridCol w="1752405">
-                  <a:extLst>
-                    <a:ext uri="{9D8B030D-6E8A-4147-A177-3AD203B41FA5}">
-                      <a16:colId xmlns:a16="http://schemas.microsoft.com/office/drawing/2014/main" val="1859728082"/>
-                    </a:ext>
-                  </a:extLst>
-                </a:gridCol>
-                <a:gridCol w="1752405">
-                  <a:extLst>
-                    <a:ext uri="{9D8B030D-6E8A-4147-A177-3AD203B41FA5}">
-                      <a16:colId xmlns:a16="http://schemas.microsoft.com/office/drawing/2014/main" val="541729026"/>
-                    </a:ext>
-                  </a:extLst>
-                </a:gridCol>
-                <a:gridCol w="1752405">
-                  <a:extLst>
-                    <a:ext uri="{9D8B030D-6E8A-4147-A177-3AD203B41FA5}">
-                      <a16:colId xmlns:a16="http://schemas.microsoft.com/office/drawing/2014/main" val="2789669071"/>
-                    </a:ext>
-                  </a:extLst>
-                </a:gridCol>
-                <a:gridCol w="1752405">
-                  <a:extLst>
-                    <a:ext uri="{9D8B030D-6E8A-4147-A177-3AD203B41FA5}">
-                      <a16:colId xmlns:a16="http://schemas.microsoft.com/office/drawing/2014/main" val="3129066123"/>
-                    </a:ext>
-                  </a:extLst>
-                </a:gridCol>
-              </a:tblGrid>
-              <a:tr h="370840">
-                <a:tc>
-                  <a:txBody>
-                    <a:bodyPr/>
-                    <a:lstStyle/>
-                    <a:p>
-                      <a:endParaRPr lang="en-US" dirty="0"/>
-                    </a:p>
-                  </a:txBody>
-                  <a:tcPr/>
-                </a:tc>
-                <a:tc>
-                  <a:txBody>
-                    <a:bodyPr/>
-                    <a:lstStyle/>
-                    <a:p>
-                      <a:r>
-                        <a:rPr lang="en-US" dirty="0" smtClean="0"/>
-                        <a:t>4/2/2020</a:t>
-                      </a:r>
-                      <a:endParaRPr lang="en-US" dirty="0"/>
-                    </a:p>
-                  </a:txBody>
-                  <a:tcPr/>
-                </a:tc>
-                <a:tc>
-                  <a:txBody>
-                    <a:bodyPr/>
-                    <a:lstStyle/>
-                    <a:p>
-                      <a:pPr marL="0" marR="0" lvl="0" indent="0" algn="l" defTabSz="914400" rtl="0" eaLnBrk="1" fontAlgn="auto" latinLnBrk="0" hangingPunct="1">
-                        <a:lnSpc>
-                          <a:spcPct val="100000"/>
-                        </a:lnSpc>
-                        <a:spcBef>
-                          <a:spcPts val="0"/>
-                        </a:spcBef>
-                        <a:spcAft>
-                          <a:spcPts val="0"/>
-                        </a:spcAft>
-                        <a:buClrTx/>
-                        <a:buSzTx/>
-                        <a:buFontTx/>
-                        <a:buNone/>
-                        <a:tabLst/>
-                        <a:defRPr/>
-                      </a:pPr>
-                      <a:r>
-                        <a:rPr lang="en-US" dirty="0" smtClean="0"/>
-                        <a:t>4/3/2020</a:t>
-                      </a:r>
-                    </a:p>
-                  </a:txBody>
-                  <a:tcPr/>
-                </a:tc>
-                <a:tc>
-                  <a:txBody>
-                    <a:bodyPr/>
-                    <a:lstStyle/>
-                    <a:p>
-                      <a:pPr marL="0" marR="0" lvl="0" indent="0" algn="l" defTabSz="914400" rtl="0" eaLnBrk="1" fontAlgn="auto" latinLnBrk="0" hangingPunct="1">
-                        <a:lnSpc>
-                          <a:spcPct val="100000"/>
-                        </a:lnSpc>
-                        <a:spcBef>
-                          <a:spcPts val="0"/>
-                        </a:spcBef>
-                        <a:spcAft>
-                          <a:spcPts val="0"/>
-                        </a:spcAft>
-                        <a:buClrTx/>
-                        <a:buSzTx/>
-                        <a:buFontTx/>
-                        <a:buNone/>
-                        <a:tabLst/>
-                        <a:defRPr/>
-                      </a:pPr>
-                      <a:r>
-                        <a:rPr lang="en-US" dirty="0" smtClean="0"/>
-                        <a:t>4/4/2020</a:t>
-                      </a:r>
-                    </a:p>
-                    <a:p>
-                      <a:endParaRPr lang="en-US" dirty="0"/>
-                    </a:p>
-                  </a:txBody>
-                  <a:tcPr/>
-                </a:tc>
-                <a:tc>
-                  <a:txBody>
-                    <a:bodyPr/>
-                    <a:lstStyle/>
-                    <a:p>
-                      <a:pPr marL="0" marR="0" lvl="0" indent="0" algn="l" defTabSz="914400" rtl="0" eaLnBrk="1" fontAlgn="auto" latinLnBrk="0" hangingPunct="1">
-                        <a:lnSpc>
-                          <a:spcPct val="100000"/>
-                        </a:lnSpc>
-                        <a:spcBef>
-                          <a:spcPts val="0"/>
-                        </a:spcBef>
-                        <a:spcAft>
-                          <a:spcPts val="0"/>
-                        </a:spcAft>
-                        <a:buClrTx/>
-                        <a:buSzTx/>
-                        <a:buFontTx/>
-                        <a:buNone/>
-                        <a:tabLst/>
-                        <a:defRPr/>
-                      </a:pPr>
-                      <a:r>
-                        <a:rPr lang="en-US" dirty="0" smtClean="0"/>
-                        <a:t>4/5/2020</a:t>
-                      </a:r>
-                    </a:p>
-                    <a:p>
-                      <a:endParaRPr lang="en-US" dirty="0"/>
-                    </a:p>
-                  </a:txBody>
-                  <a:tcPr/>
-                </a:tc>
-                <a:extLst>
-                  <a:ext uri="{0D108BD9-81ED-4DB2-BD59-A6C34878D82A}">
-                    <a16:rowId xmlns:a16="http://schemas.microsoft.com/office/drawing/2014/main" val="2812412886"/>
-                  </a:ext>
-                </a:extLst>
-              </a:tr>
-              <a:tr h="370840">
-                <a:tc>
-                  <a:txBody>
-                    <a:bodyPr/>
-                    <a:lstStyle/>
-                    <a:p>
-                      <a:r>
-                        <a:rPr lang="en-US" dirty="0" smtClean="0"/>
-                        <a:t>Raw demand</a:t>
-                      </a:r>
-                      <a:endParaRPr lang="en-US" dirty="0"/>
-                    </a:p>
-                  </a:txBody>
-                  <a:tcPr/>
-                </a:tc>
-                <a:tc>
-                  <a:txBody>
-                    <a:bodyPr/>
-                    <a:lstStyle/>
-                    <a:p>
-                      <a:r>
-                        <a:rPr lang="en-US" dirty="0" smtClean="0"/>
-                        <a:t>10000</a:t>
-                      </a:r>
-                      <a:endParaRPr lang="en-US" dirty="0"/>
-                    </a:p>
-                  </a:txBody>
-                  <a:tcPr/>
-                </a:tc>
-                <a:tc>
-                  <a:txBody>
-                    <a:bodyPr/>
-                    <a:lstStyle/>
-                    <a:p>
-                      <a:r>
-                        <a:rPr lang="en-US" dirty="0" smtClean="0"/>
-                        <a:t>20000</a:t>
-                      </a:r>
-                      <a:endParaRPr lang="en-US" dirty="0"/>
-                    </a:p>
-                  </a:txBody>
-                  <a:tcPr/>
-                </a:tc>
-                <a:tc>
-                  <a:txBody>
-                    <a:bodyPr/>
-                    <a:lstStyle/>
-                    <a:p>
-                      <a:r>
-                        <a:rPr lang="en-US" dirty="0" smtClean="0"/>
-                        <a:t>10000</a:t>
-                      </a:r>
-                      <a:endParaRPr lang="en-US" dirty="0"/>
-                    </a:p>
-                  </a:txBody>
-                  <a:tcPr/>
-                </a:tc>
-                <a:tc>
-                  <a:txBody>
-                    <a:bodyPr/>
-                    <a:lstStyle/>
-                    <a:p>
-                      <a:r>
-                        <a:rPr lang="en-US" dirty="0" smtClean="0"/>
-                        <a:t>15000</a:t>
-                      </a:r>
-                      <a:endParaRPr lang="en-US" dirty="0"/>
-                    </a:p>
-                  </a:txBody>
-                  <a:tcPr/>
-                </a:tc>
-                <a:extLst>
-                  <a:ext uri="{0D108BD9-81ED-4DB2-BD59-A6C34878D82A}">
-                    <a16:rowId xmlns:a16="http://schemas.microsoft.com/office/drawing/2014/main" val="3518629994"/>
-                  </a:ext>
-                </a:extLst>
-              </a:tr>
-              <a:tr h="370840">
-                <a:tc>
-                  <a:txBody>
-                    <a:bodyPr/>
-                    <a:lstStyle/>
-                    <a:p>
-                      <a:r>
-                        <a:rPr lang="en-US" dirty="0" smtClean="0"/>
-                        <a:t>Percentage  version</a:t>
-                      </a:r>
-                      <a:endParaRPr lang="en-US" dirty="0"/>
-                    </a:p>
-                  </a:txBody>
-                  <a:tcPr/>
-                </a:tc>
-                <a:tc>
-                  <a:txBody>
-                    <a:bodyPr/>
-                    <a:lstStyle/>
-                    <a:p>
-                      <a:r>
-                        <a:rPr lang="en-US" dirty="0" smtClean="0"/>
-                        <a:t>50%</a:t>
-                      </a:r>
-                      <a:endParaRPr lang="en-US" dirty="0"/>
-                    </a:p>
-                  </a:txBody>
-                  <a:tcPr/>
-                </a:tc>
-                <a:tc>
-                  <a:txBody>
-                    <a:bodyPr/>
-                    <a:lstStyle/>
-                    <a:p>
-                      <a:r>
-                        <a:rPr lang="en-US" dirty="0" smtClean="0"/>
-                        <a:t>100%</a:t>
-                      </a:r>
-                      <a:endParaRPr lang="en-US" dirty="0"/>
-                    </a:p>
-                  </a:txBody>
-                  <a:tcPr/>
-                </a:tc>
-                <a:tc>
-                  <a:txBody>
-                    <a:bodyPr/>
-                    <a:lstStyle/>
-                    <a:p>
-                      <a:r>
-                        <a:rPr lang="en-US" dirty="0" smtClean="0"/>
-                        <a:t>50%</a:t>
-                      </a:r>
-                      <a:endParaRPr lang="en-US" dirty="0"/>
-                    </a:p>
-                  </a:txBody>
-                  <a:tcPr/>
-                </a:tc>
-                <a:tc>
-                  <a:txBody>
-                    <a:bodyPr/>
-                    <a:lstStyle/>
-                    <a:p>
-                      <a:r>
-                        <a:rPr lang="en-US" dirty="0" smtClean="0"/>
-                        <a:t>75%</a:t>
-                      </a:r>
-                      <a:endParaRPr lang="en-US" dirty="0"/>
-                    </a:p>
-                  </a:txBody>
-                  <a:tcPr/>
-                </a:tc>
-                <a:extLst>
-                  <a:ext uri="{0D108BD9-81ED-4DB2-BD59-A6C34878D82A}">
-                    <a16:rowId xmlns:a16="http://schemas.microsoft.com/office/drawing/2014/main" val="3893080657"/>
-                  </a:ext>
-                </a:extLst>
-              </a:tr>
-            </a:tbl>
-          </a:graphicData>
-        </a:graphic>
-      </p:graphicFrame>
+            <a:r>
+              <a:rPr lang="en-US" b="1" dirty="0" smtClean="0"/>
+              <a:t>Good to have</a:t>
+            </a:r>
+            <a:r>
+              <a:rPr lang="en-US" dirty="0" smtClean="0"/>
+              <a:t>: If possible, we also would like to request the same data for the same period in 2019 and 2018 for calibration purposes.</a:t>
+            </a:r>
+          </a:p>
+        </p:txBody>
+      </p:sp>
     </p:spTree>
     <p:extLst>
       <p:ext uri="{BB962C8B-B14F-4D97-AF65-F5344CB8AC3E}">
@@ -3524,8 +3299,12 @@
           <a:lstStyle/>
           <a:p>
             <a:r>
+              <a:rPr lang="en-US" dirty="0"/>
+              <a:t>H</a:t>
+            </a:r>
+            <a:r>
               <a:rPr lang="en-US" dirty="0" smtClean="0"/>
-              <a:t>Further hourly data?</a:t>
+              <a:t>ourly data?</a:t>
             </a:r>
             <a:endParaRPr lang="en-US" dirty="0"/>
           </a:p>
@@ -3548,10 +3327,8 @@
           <a:p>
             <a:r>
               <a:rPr lang="en-US" dirty="0" smtClean="0"/>
-              <a:t>Current at 3/7/2020.</a:t>
-            </a:r>
-          </a:p>
-          <a:p>
+              <a:t>Current can only traced back to 3/7/2020.</a:t>
+            </a:r>
             <a:endParaRPr lang="en-US" dirty="0"/>
           </a:p>
           <a:p>
@@ -3565,6 +3342,22 @@
           </a:p>
           <a:p>
             <a:endParaRPr lang="en-US" dirty="0" smtClean="0"/>
+          </a:p>
+          <a:p>
+            <a:endParaRPr lang="en-US" dirty="0"/>
+          </a:p>
+          <a:p>
+            <a:pPr marL="0" indent="0">
+              <a:buNone/>
+            </a:pPr>
+            <a:r>
+              <a:rPr lang="en-US" b="1" dirty="0" smtClean="0"/>
+              <a:t>Request</a:t>
+            </a:r>
+            <a:r>
+              <a:rPr lang="en-US" dirty="0" smtClean="0"/>
+              <a:t>: hourly app activities/demand data from at least 2/15/2020. </a:t>
+            </a:r>
           </a:p>
         </p:txBody>
       </p:sp>
@@ -3615,7 +3408,7 @@
           <a:p>
             <a:r>
               <a:rPr lang="en-US" dirty="0" smtClean="0"/>
-              <a:t>More data on local scale</a:t>
+              <a:t>Local-scale data</a:t>
             </a:r>
             <a:endParaRPr lang="en-US" dirty="0"/>
           </a:p>
@@ -3633,30 +3426,36 @@
         </p:nvSpPr>
         <p:spPr/>
         <p:txBody>
-          <a:bodyPr/>
+          <a:bodyPr>
+            <a:normAutofit lnSpcReduction="10000"/>
+          </a:bodyPr>
           <a:lstStyle/>
           <a:p>
             <a:r>
               <a:rPr lang="en-US" dirty="0" smtClean="0"/>
-              <a:t>Concentrate on Columbus, Ohio;</a:t>
-            </a:r>
-          </a:p>
-          <a:p>
-            <a:endParaRPr lang="en-US" dirty="0" smtClean="0"/>
-          </a:p>
-          <a:p>
+              <a:t>Mobility dynamics change analyses concentrating </a:t>
+            </a:r>
             <a:r>
               <a:rPr lang="en-US" dirty="0" smtClean="0"/>
-              <a:t>Higher resolution on local geographies;</a:t>
-            </a:r>
-          </a:p>
-          <a:p>
-            <a:endParaRPr lang="en-US" dirty="0" smtClean="0"/>
-          </a:p>
-          <a:p>
+              <a:t>on</a:t>
+            </a:r>
             <a:r>
               <a:rPr lang="en-US" dirty="0" smtClean="0"/>
-              <a:t>Parcels? </a:t>
+              <a:t> </a:t>
+            </a:r>
+            <a:r>
+              <a:rPr lang="en-US" b="1" dirty="0" smtClean="0"/>
+              <a:t>Columbus, Ohio</a:t>
+            </a:r>
+            <a:r>
+              <a:rPr lang="en-US" dirty="0" smtClean="0"/>
+              <a:t>;</a:t>
+            </a:r>
+          </a:p>
+          <a:p>
+            <a:r>
+              <a:rPr lang="en-US" dirty="0" smtClean="0"/>
+              <a:t>Higher resolution on local geographies: Parcels? </a:t>
             </a:r>
             <a:r>
               <a:rPr lang="en-US" altLang="zh-CN" dirty="0" smtClean="0"/>
@@ -3667,9 +3466,29 @@
             <a:endParaRPr lang="en-US" dirty="0"/>
           </a:p>
           <a:p>
+            <a:pPr marL="0" indent="0">
+              <a:buNone/>
+            </a:pPr>
+            <a:r>
+              <a:rPr lang="en-US" b="1" dirty="0" smtClean="0"/>
+              <a:t>Request</a:t>
+            </a:r>
             <a:r>
               <a:rPr lang="en-US" dirty="0" smtClean="0"/>
-              <a:t>Data type: app activity; trips; OD matrix?</a:t>
+              <a:t>: aggregated or anonymous app activities/demand data with higher spatial resolution (e.g. census tract) and higher temporal resolution (e.g. every 2 min) for the Franklin County, Ohio.</a:t>
+            </a:r>
+          </a:p>
+          <a:p>
+            <a:pPr marL="0" indent="0">
+              <a:buNone/>
+            </a:pPr>
+            <a:r>
+              <a:rPr lang="en-US" b="1" dirty="0" smtClean="0"/>
+              <a:t>Good to have</a:t>
+            </a:r>
+            <a:r>
+              <a:rPr lang="en-US" dirty="0" smtClean="0"/>
+              <a:t>: aggregated or anonymous trip data with higher spatial and temporal resolution; OD matrix of the same geographies and same time period.</a:t>
             </a:r>
           </a:p>
         </p:txBody>
@@ -3750,13 +3569,13 @@
           <a:p>
             <a:r>
               <a:rPr lang="en-US" dirty="0" smtClean="0"/>
-              <a:t>Local news and reports;</a:t>
+              <a:t>From local news and reports;</a:t>
             </a:r>
           </a:p>
           <a:p>
             <a:r>
               <a:rPr lang="en-US" dirty="0" smtClean="0"/>
-              <a:t>No bias for T-Test. </a:t>
+              <a:t>Though no bias for T-Test with small sample size, still questionable. </a:t>
             </a:r>
           </a:p>
           <a:p>
@@ -3772,9 +3591,16 @@
             <a:endParaRPr lang="en-US" dirty="0" smtClean="0"/>
           </a:p>
           <a:p>
+            <a:pPr marL="0" indent="0">
+              <a:buNone/>
+            </a:pPr>
+            <a:r>
+              <a:rPr lang="en-US" b="1" dirty="0" smtClean="0"/>
+              <a:t>Good to have</a:t>
+            </a:r>
             <a:r>
               <a:rPr lang="en-US" dirty="0" smtClean="0"/>
-              <a:t>Any survey on this?</a:t>
+              <a:t>: Any further survey results on this issue? A good reference (like a Transit app blog?) will do.</a:t>
             </a:r>
           </a:p>
         </p:txBody>
@@ -3937,7 +3763,7 @@
           <a:p>
             <a:r>
               <a:rPr lang="en-US" dirty="0" smtClean="0"/>
-              <a:t>All systems</a:t>
+              <a:t>All transit systems</a:t>
             </a:r>
             <a:endParaRPr lang="en-US" dirty="0"/>
           </a:p>
@@ -3945,13 +3771,11 @@
       </p:sp>
       <p:pic>
         <p:nvPicPr>
-          <p:cNvPr id="4" name="Content Placeholder 3"/>
+          <p:cNvPr id="6" name="Picture 5"/>
           <p:cNvPicPr>
-            <a:picLocks noGrp="1" noChangeAspect="1"/>
+            <a:picLocks noChangeAspect="1"/>
           </p:cNvPicPr>
-          <p:nvPr>
-            <p:ph idx="1"/>
-          </p:nvPr>
+          <p:nvPr/>
         </p:nvPicPr>
         <p:blipFill>
           <a:blip r:embed="rId2">
@@ -3967,9 +3791,12 @@
         </p:blipFill>
         <p:spPr>
           <a:xfrm>
-            <a:off x="2611315" y="1583593"/>
-            <a:ext cx="6655776" cy="4991832"/>
+            <a:off x="2346960" y="1234440"/>
+            <a:ext cx="7498080" cy="5623560"/>
           </a:xfrm>
+          <a:prstGeom prst="rect">
+            <a:avLst/>
+          </a:prstGeom>
         </p:spPr>
       </p:pic>
     </p:spTree>
@@ -4018,44 +3845,19 @@
           <a:lstStyle/>
           <a:p>
             <a:r>
+              <a:rPr lang="en-US" dirty="0"/>
+              <a:t>L</a:t>
+            </a:r>
+            <a:r>
               <a:rPr lang="en-US" dirty="0" smtClean="0"/>
-              <a:t>An example of logistic curve</a:t>
+              <a:t>ogistic decline model</a:t>
             </a:r>
             <a:endParaRPr lang="en-US" dirty="0"/>
           </a:p>
         </p:txBody>
       </p:sp>
-      <p:pic>
-        <p:nvPicPr>
-          <p:cNvPr id="4" name="Content Placeholder 3"/>
-          <p:cNvPicPr>
-            <a:picLocks noGrp="1" noChangeAspect="1"/>
-          </p:cNvPicPr>
-          <p:nvPr>
-            <p:ph idx="1"/>
-          </p:nvPr>
-        </p:nvPicPr>
-        <p:blipFill>
-          <a:blip r:embed="rId2">
-            <a:extLst>
-              <a:ext uri="{28A0092B-C50C-407E-A947-70E740481C1C}">
-                <a14:useLocalDpi xmlns:a14="http://schemas.microsoft.com/office/drawing/2010/main" val="0"/>
-              </a:ext>
-            </a:extLst>
-          </a:blip>
-          <a:stretch>
-            <a:fillRect/>
-          </a:stretch>
-        </p:blipFill>
-        <p:spPr>
-          <a:xfrm>
-            <a:off x="434323" y="1860794"/>
-            <a:ext cx="5801784" cy="4351338"/>
-          </a:xfrm>
-        </p:spPr>
-      </p:pic>
-      <mc:AlternateContent xmlns:mc="http://schemas.openxmlformats.org/markup-compatibility/2006">
-        <mc:Choice xmlns:a14="http://schemas.microsoft.com/office/drawing/2010/main" Requires="a14">
+      <mc:AlternateContent xmlns:mc="http://schemas.openxmlformats.org/markup-compatibility/2006" xmlns:a14="http://schemas.microsoft.com/office/drawing/2010/main">
+        <mc:Choice Requires="a14">
           <p:sp>
             <p:nvSpPr>
               <p:cNvPr id="5" name="Rectangle 4"/>
@@ -4077,6 +3879,7 @@
               </a:bodyPr>
               <a:lstStyle/>
               <a:p>
+                <a:pPr/>
                 <a14:m>
                   <m:oMathPara xmlns:m="http://schemas.openxmlformats.org/officeDocument/2006/math">
                     <m:oMathParaPr>
@@ -4243,7 +4046,7 @@
             </p:txBody>
           </p:sp>
         </mc:Choice>
-        <mc:Fallback>
+        <mc:Fallback xmlns="">
           <p:sp>
             <p:nvSpPr>
               <p:cNvPr id="5" name="Rectangle 4"/>
@@ -4361,7 +4164,7 @@
         <p:spPr>
           <a:xfrm>
             <a:off x="6805246" y="2989385"/>
-            <a:ext cx="4548554" cy="3139321"/>
+            <a:ext cx="4548554" cy="3693319"/>
           </a:xfrm>
           <a:prstGeom prst="rect">
             <a:avLst/>
@@ -4393,7 +4196,7 @@
             </a:pPr>
             <a:r>
               <a:rPr lang="en-US" dirty="0" smtClean="0"/>
-              <a:t>How far can the system reach?</a:t>
+              <a:t>What is the base level of patronage during this crisis? </a:t>
             </a:r>
           </a:p>
           <a:p>
@@ -4410,7 +4213,7 @@
             </a:pPr>
             <a:r>
               <a:rPr lang="en-US" dirty="0" smtClean="0"/>
-              <a:t>How many users rely on the transit system?</a:t>
+              <a:t>Does this vary by city?</a:t>
             </a:r>
           </a:p>
           <a:p>
@@ -4427,7 +4230,37 @@
             </a:pPr>
             <a:r>
               <a:rPr lang="en-US" dirty="0" smtClean="0"/>
-              <a:t>How many transit users cannot working from home?</a:t>
+              <a:t>What explains this variation:</a:t>
+            </a:r>
+          </a:p>
+          <a:p>
+            <a:pPr marL="742950" lvl="1" indent="-285750">
+              <a:buFont typeface="Arial" panose="020B0604020202020204" pitchFamily="34" charset="0"/>
+              <a:buChar char="•"/>
+            </a:pPr>
+            <a:r>
+              <a:rPr lang="en-US" dirty="0" smtClean="0"/>
+              <a:t>Transit dependence?</a:t>
+            </a:r>
+          </a:p>
+          <a:p>
+            <a:pPr marL="742950" lvl="1" indent="-285750">
+              <a:buFont typeface="Arial" panose="020B0604020202020204" pitchFamily="34" charset="0"/>
+              <a:buChar char="•"/>
+            </a:pPr>
+            <a:r>
+              <a:rPr lang="en-US" dirty="0" smtClean="0"/>
+              <a:t>Jobs mix?</a:t>
+            </a:r>
+          </a:p>
+          <a:p>
+            <a:pPr marL="742950" lvl="1" indent="-285750">
+              <a:buFont typeface="Arial" panose="020B0604020202020204" pitchFamily="34" charset="0"/>
+              <a:buChar char="•"/>
+            </a:pPr>
+            <a:r>
+              <a:rPr lang="en-US" dirty="0" smtClean="0"/>
+              <a:t>Socioeconomic status?</a:t>
             </a:r>
           </a:p>
           <a:p>
@@ -4442,20 +4275,39 @@
               <a:buFont typeface="Arial" panose="020B0604020202020204" pitchFamily="34" charset="0"/>
               <a:buChar char="•"/>
             </a:pPr>
-            <a:r>
-              <a:rPr lang="en-US" dirty="0" smtClean="0"/>
-              <a:t>How aware are the local people?</a:t>
-            </a:r>
-          </a:p>
-          <a:p>
-            <a:pPr marL="285750" indent="-285750">
-              <a:buFont typeface="Arial" panose="020B0604020202020204" pitchFamily="34" charset="0"/>
-              <a:buChar char="•"/>
-            </a:pPr>
             <a:endParaRPr lang="en-US" dirty="0"/>
           </a:p>
         </p:txBody>
       </p:sp>
+      <p:pic>
+        <p:nvPicPr>
+          <p:cNvPr id="6" name="Content Placeholder 5"/>
+          <p:cNvPicPr>
+            <a:picLocks noGrp="1" noChangeAspect="1"/>
+          </p:cNvPicPr>
+          <p:nvPr>
+            <p:ph idx="1"/>
+          </p:nvPr>
+        </p:nvPicPr>
+        <p:blipFill>
+          <a:blip r:embed="rId4">
+            <a:extLst>
+              <a:ext uri="{28A0092B-C50C-407E-A947-70E740481C1C}">
+                <a14:useLocalDpi xmlns:a14="http://schemas.microsoft.com/office/drawing/2010/main" val="0"/>
+              </a:ext>
+            </a:extLst>
+          </a:blip>
+          <a:stretch>
+            <a:fillRect/>
+          </a:stretch>
+        </p:blipFill>
+        <p:spPr>
+          <a:xfrm>
+            <a:off x="487647" y="1860794"/>
+            <a:ext cx="5801784" cy="4351338"/>
+          </a:xfrm>
+        </p:spPr>
+      </p:pic>
     </p:spTree>
     <p:extLst>
       <p:ext uri="{BB962C8B-B14F-4D97-AF65-F5344CB8AC3E}">
@@ -4554,8 +4406,8 @@
         </p:nvSpPr>
         <p:spPr>
           <a:xfrm>
-            <a:off x="2693377" y="5088511"/>
-            <a:ext cx="3015762" cy="1477328"/>
+            <a:off x="2602584" y="886162"/>
+            <a:ext cx="3272921" cy="1200329"/>
           </a:xfrm>
           <a:prstGeom prst="rect">
             <a:avLst/>
@@ -4571,105 +4423,34 @@
             <a:r>
               <a:rPr lang="en-US" dirty="0" smtClean="0">
                 <a:solidFill>
-                  <a:schemeClr val="accent1">
-                    <a:lumMod val="60000"/>
-                    <a:lumOff val="40000"/>
-                  </a:schemeClr>
+                  <a:srgbClr val="00B0F0"/>
                 </a:solidFill>
               </a:rPr>
-              <a:t>Blue: </a:t>
-            </a:r>
-          </a:p>
-          <a:p>
-            <a:pPr marL="285750" indent="-285750">
-              <a:buFont typeface="Arial" panose="020B0604020202020204" pitchFamily="34" charset="0"/>
-              <a:buChar char="•"/>
-            </a:pPr>
+              <a:t>Blue</a:t>
+            </a:r>
+            <a:r>
+              <a:rPr lang="en-US" dirty="0">
+                <a:solidFill>
+                  <a:schemeClr val="bg1"/>
+                </a:solidFill>
+              </a:rPr>
+              <a:t> </a:t>
+            </a:r>
             <a:r>
               <a:rPr lang="en-US" dirty="0" smtClean="0">
                 <a:solidFill>
-                  <a:schemeClr val="accent1">
-                    <a:lumMod val="60000"/>
-                    <a:lumOff val="40000"/>
-                  </a:schemeClr>
+                  <a:schemeClr val="bg1"/>
                 </a:solidFill>
               </a:rPr>
-              <a:t>Don’t care about the coronavirus;</a:t>
-            </a:r>
-          </a:p>
-          <a:p>
-            <a:pPr marL="285750" indent="-285750">
-              <a:buFont typeface="Arial" panose="020B0604020202020204" pitchFamily="34" charset="0"/>
-              <a:buChar char="•"/>
-            </a:pPr>
-            <a:r>
-              <a:rPr lang="en-US" dirty="0" smtClean="0">
-                <a:solidFill>
-                  <a:schemeClr val="accent1">
-                    <a:lumMod val="60000"/>
-                    <a:lumOff val="40000"/>
-                  </a:schemeClr>
-                </a:solidFill>
-              </a:rPr>
-              <a:t>Rely on transit system</a:t>
-            </a:r>
-          </a:p>
-          <a:p>
-            <a:pPr marL="285750" indent="-285750">
-              <a:buFont typeface="Arial" panose="020B0604020202020204" pitchFamily="34" charset="0"/>
-              <a:buChar char="•"/>
-            </a:pPr>
-            <a:r>
-              <a:rPr lang="en-US" dirty="0" smtClean="0">
-                <a:solidFill>
-                  <a:schemeClr val="accent1">
-                    <a:lumMod val="60000"/>
-                    <a:lumOff val="40000"/>
-                  </a:schemeClr>
-                </a:solidFill>
-              </a:rPr>
-              <a:t>Cannot work from home</a:t>
-            </a:r>
-            <a:endParaRPr lang="en-US" dirty="0">
-              <a:solidFill>
-                <a:schemeClr val="accent1">
-                  <a:lumMod val="60000"/>
-                  <a:lumOff val="40000"/>
-                </a:schemeClr>
-              </a:solidFill>
-            </a:endParaRPr>
-          </a:p>
-        </p:txBody>
-      </p:sp>
-      <p:sp>
-        <p:nvSpPr>
-          <p:cNvPr id="6" name="TextBox 5"/>
-          <p:cNvSpPr txBox="1"/>
-          <p:nvPr/>
-        </p:nvSpPr>
-        <p:spPr>
-          <a:xfrm>
-            <a:off x="2693377" y="537588"/>
-            <a:ext cx="3015762" cy="1754326"/>
-          </a:xfrm>
-          <a:prstGeom prst="rect">
-            <a:avLst/>
-          </a:prstGeom>
-          <a:noFill/>
-        </p:spPr>
-        <p:txBody>
-          <a:bodyPr wrap="square" rtlCol="0">
-            <a:spAutoFit/>
-          </a:bodyPr>
-          <a:lstStyle/>
-          <a:p>
+              <a:t>versus </a:t>
+            </a:r>
             <a:r>
               <a:rPr lang="en-US" dirty="0" smtClean="0">
                 <a:solidFill>
                   <a:srgbClr val="FF0000"/>
                 </a:solidFill>
               </a:rPr>
-              <a:t>Red: </a:t>
+              <a:t>red</a:t>
             </a:r>
           </a:p>
           <a:p>
@@ -4680,10 +4461,10 @@
             <a:r>
               <a:rPr lang="en-US" dirty="0" smtClean="0">
                 <a:solidFill>
-                  <a:srgbClr val="FF0000"/>
+                  <a:schemeClr val="bg1"/>
                 </a:solidFill>
               </a:rPr>
-              <a:t>Care a lot about the coronavirus;</a:t>
+              <a:t>Transit dependence? </a:t>
             </a:r>
           </a:p>
           <a:p>
@@ -4694,10 +4475,10 @@
             <a:r>
               <a:rPr lang="en-US" dirty="0" smtClean="0">
                 <a:solidFill>
-                  <a:srgbClr val="FF0000"/>
+                  <a:schemeClr val="bg1"/>
                 </a:solidFill>
               </a:rPr>
-              <a:t>Can switch to other transportation anytime;</a:t>
+              <a:t>Ability to work from home?</a:t>
             </a:r>
           </a:p>
           <a:p>
@@ -4708,16 +4489,11 @@
             <a:r>
               <a:rPr lang="en-US" dirty="0" smtClean="0">
                 <a:solidFill>
-                  <a:srgbClr val="FF0000"/>
+                  <a:schemeClr val="bg1"/>
                 </a:solidFill>
               </a:rPr>
-              <a:t>Can work from home</a:t>
-            </a:r>
-            <a:endParaRPr lang="en-US" dirty="0">
-              <a:solidFill>
-                <a:srgbClr val="FF0000"/>
-              </a:solidFill>
-            </a:endParaRPr>
+              <a:t>Concern, local leadership?</a:t>
+            </a:r>
           </a:p>
         </p:txBody>
       </p:sp>
@@ -4868,37 +4644,62 @@
           <a:lstStyle/>
           <a:p>
             <a:r>
+              <a:rPr lang="en-US" dirty="0" smtClean="0"/>
+              <a:t>Cities have different floor </a:t>
+            </a:r>
+            <a:r>
+              <a:rPr lang="en-US" dirty="0" smtClean="0"/>
+              <a:t>values:</a:t>
+            </a:r>
+          </a:p>
+          <a:p>
+            <a:pPr lvl="1"/>
+            <a:r>
+              <a:rPr lang="en-US" dirty="0" smtClean="0"/>
+              <a:t>University of California Berkeley, The Ride Ann Arbor, and TCAT Ithaca: 90%+</a:t>
+            </a:r>
+          </a:p>
+          <a:p>
+            <a:pPr lvl="1"/>
+            <a:r>
               <a:rPr lang="en-US" dirty="0"/>
-              <a:t>Every city may have very different platform value:</a:t>
-            </a:r>
+              <a:t>Seattle and Bay area: 80</a:t>
+            </a:r>
+            <a:r>
+              <a:rPr lang="en-US" dirty="0" smtClean="0"/>
+              <a:t>%</a:t>
+            </a:r>
+            <a:endParaRPr lang="en-US" dirty="0"/>
           </a:p>
           <a:p>
             <a:pPr lvl="1"/>
             <a:r>
               <a:rPr lang="en-US" dirty="0"/>
-              <a:t>Columbus: 50% ~</a:t>
+              <a:t>New York City: 70% </a:t>
             </a:r>
           </a:p>
           <a:p>
             <a:pPr lvl="1"/>
             <a:r>
               <a:rPr lang="en-US" dirty="0"/>
-              <a:t>New York: 70% ~</a:t>
-            </a:r>
+              <a:t>Ohio (Columbus, Cincinnati, Cleveland): 50% - 60</a:t>
+            </a:r>
+            <a:r>
+              <a:rPr lang="en-US" dirty="0" smtClean="0"/>
+              <a:t>%</a:t>
+            </a:r>
+            <a:endParaRPr lang="en-US" dirty="0"/>
           </a:p>
           <a:p>
             <a:pPr lvl="1"/>
             <a:r>
               <a:rPr lang="en-US" dirty="0"/>
-              <a:t>Seattle and Bay area: 80%~</a:t>
+              <a:t>Florida (Tampa, Miami, and Orlando): 40% - 50%</a:t>
             </a:r>
           </a:p>
           <a:p>
             <a:pPr lvl="1"/>
-            <a:r>
-              <a:rPr lang="en-US" dirty="0"/>
-              <a:t>UCB: 90%+</a:t>
-            </a:r>
+            <a:endParaRPr lang="en-US" dirty="0" smtClean="0"/>
           </a:p>
           <a:p>
             <a:endParaRPr lang="en-US" dirty="0"/>
@@ -4993,46 +4794,44 @@
             </a:r>
             <a:r>
               <a:rPr lang="en-US" dirty="0" smtClean="0"/>
-              <a:t>he interval </a:t>
+              <a:t>he time lag between covid-19 case increase and transit demand </a:t>
             </a:r>
             <a:r>
               <a:rPr lang="en-US" dirty="0"/>
-              <a:t>between </a:t>
-            </a:r>
+              <a:t>decrease</a:t>
+            </a:r>
+          </a:p>
+          <a:p>
+            <a:endParaRPr lang="en-US" dirty="0" smtClean="0"/>
+          </a:p>
+          <a:p>
             <a:r>
               <a:rPr lang="en-US" dirty="0" smtClean="0"/>
-              <a:t>actual case </a:t>
+              <a:t>Demand </a:t>
             </a:r>
             <a:r>
               <a:rPr lang="en-US" dirty="0"/>
-              <a:t>increase and demand decrease</a:t>
-            </a:r>
-          </a:p>
-          <a:p>
-            <a:r>
-              <a:rPr lang="en-US" dirty="0"/>
-              <a:t>Demand decrease is </a:t>
+              <a:t>decrease </a:t>
             </a:r>
             <a:r>
               <a:rPr lang="en-US" dirty="0" smtClean="0"/>
-              <a:t>usually (but not always) </a:t>
-            </a:r>
-            <a:r>
-              <a:rPr lang="en-US" dirty="0"/>
-              <a:t>earlier than actual case increase</a:t>
-            </a:r>
+              <a:t>typically earlier than case increase in a community</a:t>
+            </a:r>
+          </a:p>
+          <a:p>
+            <a:pPr lvl="1"/>
+            <a:r>
+              <a:rPr lang="en-US" sz="2800" dirty="0" smtClean="0"/>
+              <a:t>But not always!</a:t>
+            </a:r>
+          </a:p>
+          <a:p>
+            <a:endParaRPr lang="en-US" dirty="0" smtClean="0"/>
+          </a:p>
+          <a:p>
             <a:r>
               <a:rPr lang="en-US" dirty="0" smtClean="0"/>
-              <a:t>.</a:t>
-            </a:r>
-          </a:p>
-          <a:p>
-            <a:endParaRPr lang="en-US" dirty="0"/>
-          </a:p>
-          <a:p>
-            <a:r>
-              <a:rPr lang="en-US" dirty="0" smtClean="0"/>
-              <a:t>Goal: to see whether people started to avoid transit trips when the local community spread began.</a:t>
+              <a:t>Objective: when did people start to avoid transit trips relative to the local community spread?  Are there variations across cities?</a:t>
             </a:r>
           </a:p>
           <a:p>
@@ -5129,7 +4928,7 @@
         </p:blipFill>
         <p:spPr bwMode="auto">
           <a:xfrm>
-            <a:off x="113749" y="-105507"/>
+            <a:off x="113749" y="0"/>
             <a:ext cx="11964502" cy="6963507"/>
           </a:xfrm>
           <a:prstGeom prst="rect">
@@ -5162,47 +4961,14 @@
       </p:pic>
       <p:sp>
         <p:nvSpPr>
-          <p:cNvPr id="5" name="TextBox 4"/>
-          <p:cNvSpPr txBox="1"/>
-          <p:nvPr/>
-        </p:nvSpPr>
-        <p:spPr>
-          <a:xfrm>
-            <a:off x="2693377" y="537588"/>
-            <a:ext cx="3015762" cy="369332"/>
-          </a:xfrm>
-          <a:prstGeom prst="rect">
-            <a:avLst/>
-          </a:prstGeom>
-          <a:noFill/>
-        </p:spPr>
-        <p:txBody>
-          <a:bodyPr wrap="square" rtlCol="0">
-            <a:spAutoFit/>
-          </a:bodyPr>
-          <a:lstStyle/>
-          <a:p>
-            <a:r>
-              <a:rPr lang="en-US" dirty="0" smtClean="0">
-                <a:solidFill>
-                  <a:srgbClr val="FF0000"/>
-                </a:solidFill>
-              </a:rPr>
-              <a:t>Red: responded late</a:t>
-            </a:r>
-          </a:p>
-        </p:txBody>
-      </p:sp>
-      <p:sp>
-        <p:nvSpPr>
           <p:cNvPr id="6" name="TextBox 5"/>
           <p:cNvSpPr txBox="1"/>
           <p:nvPr/>
         </p:nvSpPr>
         <p:spPr>
           <a:xfrm>
-            <a:off x="2693377" y="1114138"/>
-            <a:ext cx="3015762" cy="369332"/>
+            <a:off x="2777684" y="902295"/>
+            <a:ext cx="3015762" cy="923330"/>
           </a:xfrm>
           <a:prstGeom prst="rect">
             <a:avLst/>
@@ -5226,6 +4992,19 @@
               </a:rPr>
               <a:t>Blue: responded early</a:t>
             </a:r>
+          </a:p>
+          <a:p>
+            <a:pPr lvl="0"/>
+            <a:r>
+              <a:rPr lang="en-US" dirty="0">
+                <a:solidFill>
+                  <a:srgbClr val="FF0000"/>
+                </a:solidFill>
+              </a:rPr>
+              <a:t>Red: responded late</a:t>
+            </a:r>
+          </a:p>
+          <a:p>
             <a:endParaRPr lang="en-US" dirty="0">
               <a:solidFill>
                 <a:schemeClr val="accent1">
@@ -5267,44 +5046,6 @@
           <a:chExt cx="0" cy="0"/>
         </a:xfrm>
       </p:grpSpPr>
-      <p:sp>
-        <p:nvSpPr>
-          <p:cNvPr id="2" name="Title 1"/>
-          <p:cNvSpPr>
-            <a:spLocks noGrp="1"/>
-          </p:cNvSpPr>
-          <p:nvPr>
-            <p:ph type="title"/>
-          </p:nvPr>
-        </p:nvSpPr>
-        <p:spPr/>
-        <p:txBody>
-          <a:bodyPr/>
-          <a:lstStyle/>
-          <a:p>
-            <a:endParaRPr lang="en-US"/>
-          </a:p>
-        </p:txBody>
-      </p:sp>
-      <p:sp>
-        <p:nvSpPr>
-          <p:cNvPr id="3" name="Content Placeholder 2"/>
-          <p:cNvSpPr>
-            <a:spLocks noGrp="1"/>
-          </p:cNvSpPr>
-          <p:nvPr>
-            <p:ph idx="1"/>
-          </p:nvPr>
-        </p:nvSpPr>
-        <p:spPr/>
-        <p:txBody>
-          <a:bodyPr/>
-          <a:lstStyle/>
-          <a:p>
-            <a:endParaRPr lang="en-US"/>
-          </a:p>
-        </p:txBody>
-      </p:sp>
       <p:pic>
         <p:nvPicPr>
           <p:cNvPr id="4" name="Picture 3"/>
@@ -5384,29 +5125,14 @@
           <a:lstStyle/>
           <a:p>
             <a:r>
+              <a:rPr lang="en-US" sz="5400" dirty="0"/>
+              <a:t>Q</a:t>
+            </a:r>
+            <a:r>
               <a:rPr lang="en-US" sz="5400" dirty="0" smtClean="0"/>
-              <a:t>Some questions for Transit app</a:t>
+              <a:t>uestions for Transit</a:t>
             </a:r>
             <a:endParaRPr lang="en-US" sz="5400" dirty="0"/>
-          </a:p>
-        </p:txBody>
-      </p:sp>
-      <p:sp>
-        <p:nvSpPr>
-          <p:cNvPr id="3" name="Subtitle 2"/>
-          <p:cNvSpPr>
-            <a:spLocks noGrp="1"/>
-          </p:cNvSpPr>
-          <p:nvPr>
-            <p:ph type="subTitle" idx="1"/>
-          </p:nvPr>
-        </p:nvSpPr>
-        <p:spPr/>
-        <p:txBody>
-          <a:bodyPr/>
-          <a:lstStyle/>
-          <a:p>
-            <a:endParaRPr lang="en-US"/>
           </a:p>
         </p:txBody>
       </p:sp>

</xml_diff>

<commit_message>
Update PPT for Olivia
</commit_message>
<xml_diff>
--- a/doc/pre_results.pptx
+++ b/doc/pre_results.pptx
@@ -6,19 +6,23 @@
   </p:sldMasterIdLst>
   <p:sldIdLst>
     <p:sldId id="256" r:id="rId2"/>
-    <p:sldId id="274" r:id="rId3"/>
-    <p:sldId id="275" r:id="rId4"/>
-    <p:sldId id="276" r:id="rId5"/>
-    <p:sldId id="271" r:id="rId6"/>
-    <p:sldId id="273" r:id="rId7"/>
-    <p:sldId id="277" r:id="rId8"/>
+    <p:sldId id="279" r:id="rId3"/>
+    <p:sldId id="274" r:id="rId4"/>
+    <p:sldId id="275" r:id="rId5"/>
+    <p:sldId id="283" r:id="rId6"/>
+    <p:sldId id="271" r:id="rId7"/>
+    <p:sldId id="276" r:id="rId8"/>
     <p:sldId id="278" r:id="rId9"/>
-    <p:sldId id="280" r:id="rId10"/>
-    <p:sldId id="279" r:id="rId11"/>
-    <p:sldId id="284" r:id="rId12"/>
-    <p:sldId id="281" r:id="rId13"/>
-    <p:sldId id="282" r:id="rId14"/>
-    <p:sldId id="283" r:id="rId15"/>
+    <p:sldId id="277" r:id="rId10"/>
+    <p:sldId id="280" r:id="rId11"/>
+    <p:sldId id="281" r:id="rId12"/>
+    <p:sldId id="282" r:id="rId13"/>
+    <p:sldId id="287" r:id="rId14"/>
+    <p:sldId id="286" r:id="rId15"/>
+    <p:sldId id="288" r:id="rId16"/>
+    <p:sldId id="284" r:id="rId17"/>
+    <p:sldId id="289" r:id="rId18"/>
+    <p:sldId id="290" r:id="rId19"/>
   </p:sldIdLst>
   <p:sldSz cx="12192000" cy="6858000"/>
   <p:notesSz cx="6858000" cy="9144000"/>
@@ -137,48 +141,6 @@
 </p:cmAuthorLst>
 </file>
 
-<file path=ppt/comments/comment1.xml><?xml version="1.0" encoding="utf-8"?>
-<p:cmLst xmlns:a="http://schemas.openxmlformats.org/drawingml/2006/main" xmlns:r="http://schemas.openxmlformats.org/officeDocument/2006/relationships" xmlns:p="http://schemas.openxmlformats.org/presentationml/2006/main">
-  <p:cm authorId="1" dt="2020-04-08T13:44:48.475" idx="1">
-    <p:pos x="5838" y="998"/>
-    <p:text>Need to label x and y axis.</p:text>
-    <p:extLst>
-      <p:ext uri="{C676402C-5697-4E1C-873F-D02D1690AC5C}">
-        <p15:threadingInfo xmlns:p15="http://schemas.microsoft.com/office/powerpoint/2012/main" timeZoneBias="240"/>
-      </p:ext>
-    </p:extLst>
-  </p:cm>
-</p:cmLst>
-</file>
-
-<file path=ppt/comments/comment2.xml><?xml version="1.0" encoding="utf-8"?>
-<p:cmLst xmlns:a="http://schemas.openxmlformats.org/drawingml/2006/main" xmlns:r="http://schemas.openxmlformats.org/officeDocument/2006/relationships" xmlns:p="http://schemas.openxmlformats.org/presentationml/2006/main">
-  <p:cm authorId="1" dt="2020-04-08T13:46:37.872" idx="2">
-    <p:pos x="3928" y="1172"/>
-    <p:text>label the x and y axis</p:text>
-    <p:extLst>
-      <p:ext uri="{C676402C-5697-4E1C-873F-D02D1690AC5C}">
-        <p15:threadingInfo xmlns:p15="http://schemas.microsoft.com/office/powerpoint/2012/main" timeZoneBias="240"/>
-      </p:ext>
-    </p:extLst>
-  </p:cm>
-</p:cmLst>
-</file>
-
-<file path=ppt/comments/comment3.xml><?xml version="1.0" encoding="utf-8"?>
-<p:cmLst xmlns:a="http://schemas.openxmlformats.org/drawingml/2006/main" xmlns:r="http://schemas.openxmlformats.org/officeDocument/2006/relationships" xmlns:p="http://schemas.openxmlformats.org/presentationml/2006/main">
-  <p:cm authorId="1" dt="2020-04-08T14:08:02.627" idx="4">
-    <p:pos x="3758" y="1181"/>
-    <p:text>List some more, in rank order (highest to lowest)</p:text>
-    <p:extLst>
-      <p:ext uri="{C676402C-5697-4E1C-873F-D02D1690AC5C}">
-        <p15:threadingInfo xmlns:p15="http://schemas.microsoft.com/office/powerpoint/2012/main" timeZoneBias="240"/>
-      </p:ext>
-    </p:extLst>
-  </p:cm>
-</p:cmLst>
-</file>
-
 <file path=ppt/slideLayouts/slideLayout1.xml><?xml version="1.0" encoding="utf-8"?>
 <p:sldLayout xmlns:a="http://schemas.openxmlformats.org/drawingml/2006/main" xmlns:r="http://schemas.openxmlformats.org/officeDocument/2006/relationships" xmlns:p="http://schemas.openxmlformats.org/presentationml/2006/main" type="title" preserve="1">
   <p:cSld name="Title Slide">
@@ -308,7 +270,7 @@
           <a:p>
             <a:fld id="{F24761F3-EBE3-47CA-9C15-B1B8E3A6DAF7}" type="datetimeFigureOut">
               <a:rPr lang="en-US" smtClean="0"/>
-              <a:t>4/8/2020</a:t>
+              <a:t>5/4/2020</a:t>
             </a:fld>
             <a:endParaRPr lang="en-US"/>
           </a:p>
@@ -476,7 +438,7 @@
           <a:p>
             <a:fld id="{F24761F3-EBE3-47CA-9C15-B1B8E3A6DAF7}" type="datetimeFigureOut">
               <a:rPr lang="en-US" smtClean="0"/>
-              <a:t>4/8/2020</a:t>
+              <a:t>5/4/2020</a:t>
             </a:fld>
             <a:endParaRPr lang="en-US"/>
           </a:p>
@@ -654,7 +616,7 @@
           <a:p>
             <a:fld id="{F24761F3-EBE3-47CA-9C15-B1B8E3A6DAF7}" type="datetimeFigureOut">
               <a:rPr lang="en-US" smtClean="0"/>
-              <a:t>4/8/2020</a:t>
+              <a:t>5/4/2020</a:t>
             </a:fld>
             <a:endParaRPr lang="en-US"/>
           </a:p>
@@ -822,7 +784,7 @@
           <a:p>
             <a:fld id="{F24761F3-EBE3-47CA-9C15-B1B8E3A6DAF7}" type="datetimeFigureOut">
               <a:rPr lang="en-US" smtClean="0"/>
-              <a:t>4/8/2020</a:t>
+              <a:t>5/4/2020</a:t>
             </a:fld>
             <a:endParaRPr lang="en-US"/>
           </a:p>
@@ -1067,7 +1029,7 @@
           <a:p>
             <a:fld id="{F24761F3-EBE3-47CA-9C15-B1B8E3A6DAF7}" type="datetimeFigureOut">
               <a:rPr lang="en-US" smtClean="0"/>
-              <a:t>4/8/2020</a:t>
+              <a:t>5/4/2020</a:t>
             </a:fld>
             <a:endParaRPr lang="en-US"/>
           </a:p>
@@ -1296,7 +1258,7 @@
           <a:p>
             <a:fld id="{F24761F3-EBE3-47CA-9C15-B1B8E3A6DAF7}" type="datetimeFigureOut">
               <a:rPr lang="en-US" smtClean="0"/>
-              <a:t>4/8/2020</a:t>
+              <a:t>5/4/2020</a:t>
             </a:fld>
             <a:endParaRPr lang="en-US"/>
           </a:p>
@@ -1660,7 +1622,7 @@
           <a:p>
             <a:fld id="{F24761F3-EBE3-47CA-9C15-B1B8E3A6DAF7}" type="datetimeFigureOut">
               <a:rPr lang="en-US" smtClean="0"/>
-              <a:t>4/8/2020</a:t>
+              <a:t>5/4/2020</a:t>
             </a:fld>
             <a:endParaRPr lang="en-US"/>
           </a:p>
@@ -1777,7 +1739,7 @@
           <a:p>
             <a:fld id="{F24761F3-EBE3-47CA-9C15-B1B8E3A6DAF7}" type="datetimeFigureOut">
               <a:rPr lang="en-US" smtClean="0"/>
-              <a:t>4/8/2020</a:t>
+              <a:t>5/4/2020</a:t>
             </a:fld>
             <a:endParaRPr lang="en-US"/>
           </a:p>
@@ -1872,7 +1834,7 @@
           <a:p>
             <a:fld id="{F24761F3-EBE3-47CA-9C15-B1B8E3A6DAF7}" type="datetimeFigureOut">
               <a:rPr lang="en-US" smtClean="0"/>
-              <a:t>4/8/2020</a:t>
+              <a:t>5/4/2020</a:t>
             </a:fld>
             <a:endParaRPr lang="en-US"/>
           </a:p>
@@ -2147,7 +2109,7 @@
           <a:p>
             <a:fld id="{F24761F3-EBE3-47CA-9C15-B1B8E3A6DAF7}" type="datetimeFigureOut">
               <a:rPr lang="en-US" smtClean="0"/>
-              <a:t>4/8/2020</a:t>
+              <a:t>5/4/2020</a:t>
             </a:fld>
             <a:endParaRPr lang="en-US"/>
           </a:p>
@@ -2399,7 +2361,7 @@
           <a:p>
             <a:fld id="{F24761F3-EBE3-47CA-9C15-B1B8E3A6DAF7}" type="datetimeFigureOut">
               <a:rPr lang="en-US" smtClean="0"/>
-              <a:t>4/8/2020</a:t>
+              <a:t>5/4/2020</a:t>
             </a:fld>
             <a:endParaRPr lang="en-US"/>
           </a:p>
@@ -2610,7 +2572,7 @@
           <a:p>
             <a:fld id="{F24761F3-EBE3-47CA-9C15-B1B8E3A6DAF7}" type="datetimeFigureOut">
               <a:rPr lang="en-US" smtClean="0"/>
-              <a:t>4/8/2020</a:t>
+              <a:t>5/4/2020</a:t>
             </a:fld>
             <a:endParaRPr lang="en-US"/>
           </a:p>
@@ -3160,9 +3122,10 @@
           <a:lstStyle/>
           <a:p>
             <a:r>
-              <a:rPr lang="en-US" dirty="0"/>
-              <a:t>Need raw ridership/demand data for averaging purposes</a:t>
-            </a:r>
+              <a:rPr lang="en-US" dirty="0" smtClean="0"/>
+              <a:t>Your occupation matters</a:t>
+            </a:r>
+            <a:endParaRPr lang="en-US" dirty="0"/>
           </a:p>
         </p:txBody>
       </p:sp>
@@ -3178,85 +3141,189 @@
         </p:nvSpPr>
         <p:spPr/>
         <p:txBody>
-          <a:bodyPr/>
-          <a:lstStyle/>
-          <a:p>
+          <a:bodyPr>
+            <a:normAutofit fontScale="92500" lnSpcReduction="10000"/>
+          </a:bodyPr>
+          <a:lstStyle/>
+          <a:p>
+            <a:pPr marL="0" indent="0">
+              <a:buNone/>
+            </a:pPr>
             <a:r>
               <a:rPr lang="en-US" dirty="0" smtClean="0"/>
-              <a:t>Cannot aggregate different systems/days with percentages.</a:t>
+              <a:t>From our research:</a:t>
             </a:r>
           </a:p>
           <a:p>
             <a:r>
               <a:rPr lang="en-US" dirty="0" smtClean="0"/>
-              <a:t>Need raw app activities data for the aggregation.</a:t>
+              <a:t>The amount of essential transit passengers is highly correlated with </a:t>
+            </a:r>
+            <a:r>
+              <a:rPr lang="en-US" dirty="0" smtClean="0">
+                <a:solidFill>
+                  <a:srgbClr val="FF0000"/>
+                </a:solidFill>
+              </a:rPr>
+              <a:t>the ratio of people with non-physical occupations</a:t>
+            </a:r>
+          </a:p>
+          <a:p>
+            <a:r>
+              <a:rPr lang="en-US" dirty="0" smtClean="0"/>
+              <a:t>Or: </a:t>
+            </a:r>
+            <a:r>
+              <a:rPr lang="en-US" dirty="0" smtClean="0">
+                <a:solidFill>
+                  <a:srgbClr val="FF0000"/>
+                </a:solidFill>
+              </a:rPr>
+              <a:t>how many people can work from home</a:t>
+            </a:r>
+          </a:p>
+          <a:p>
+            <a:pPr marL="0" indent="0">
+              <a:buNone/>
+            </a:pPr>
+            <a:endParaRPr lang="en-US" dirty="0" smtClean="0"/>
+          </a:p>
+          <a:p>
+            <a:pPr marL="0" indent="0">
+              <a:buNone/>
+            </a:pPr>
+            <a:r>
+              <a:rPr lang="en-US" dirty="0" smtClean="0"/>
+              <a:t>From the survey:</a:t>
+            </a:r>
+          </a:p>
+          <a:p>
+            <a:r>
+              <a:rPr lang="en-US" dirty="0" smtClean="0"/>
+              <a:t>The top 4 industry: </a:t>
+            </a:r>
+          </a:p>
+          <a:p>
+            <a:pPr lvl="1"/>
+            <a:r>
+              <a:rPr lang="en-US" dirty="0" smtClean="0"/>
+              <a:t>Food;</a:t>
+            </a:r>
+          </a:p>
+          <a:p>
+            <a:pPr lvl="1"/>
+            <a:r>
+              <a:rPr lang="en-US" dirty="0" smtClean="0"/>
+              <a:t>Health care;</a:t>
+            </a:r>
+          </a:p>
+          <a:p>
+            <a:pPr lvl="1"/>
+            <a:r>
+              <a:rPr lang="en-US" dirty="0" smtClean="0"/>
+              <a:t>Sales;</a:t>
+            </a:r>
+          </a:p>
+          <a:p>
+            <a:pPr lvl="1"/>
+            <a:r>
+              <a:rPr lang="en-US" dirty="0" smtClean="0"/>
+              <a:t>Health care </a:t>
+            </a:r>
+            <a:r>
+              <a:rPr lang="en-US" dirty="0" err="1" smtClean="0"/>
+              <a:t>practioners</a:t>
+            </a:r>
+            <a:r>
+              <a:rPr lang="en-US" dirty="0" smtClean="0"/>
+              <a:t> and technical</a:t>
             </a:r>
             <a:endParaRPr lang="en-US" dirty="0"/>
           </a:p>
-          <a:p>
-            <a:endParaRPr lang="en-US" dirty="0" smtClean="0"/>
-          </a:p>
-          <a:p>
-            <a:endParaRPr lang="en-US" dirty="0"/>
-          </a:p>
-          <a:p>
-            <a:pPr marL="0" indent="0">
-              <a:buNone/>
+        </p:txBody>
+      </p:sp>
+      <p:sp>
+        <p:nvSpPr>
+          <p:cNvPr id="4" name="TextBox 3"/>
+          <p:cNvSpPr txBox="1"/>
+          <p:nvPr/>
+        </p:nvSpPr>
+        <p:spPr>
+          <a:xfrm>
+            <a:off x="6525126" y="4352879"/>
+            <a:ext cx="4828674" cy="1692771"/>
+          </a:xfrm>
+          <a:prstGeom prst="rect">
+            <a:avLst/>
+          </a:prstGeom>
+          <a:noFill/>
+        </p:spPr>
+        <p:txBody>
+          <a:bodyPr wrap="square" rtlCol="0">
+            <a:spAutoFit/>
+          </a:bodyPr>
+          <a:lstStyle/>
+          <a:p>
+            <a:pPr marL="457200" indent="-457200">
+              <a:buFont typeface="Arial" panose="020B0604020202020204" pitchFamily="34" charset="0"/>
+              <a:buChar char="•"/>
             </a:pPr>
-            <a:endParaRPr lang="en-US" dirty="0"/>
-          </a:p>
-          <a:p>
-            <a:pPr marL="0" indent="0">
-              <a:buNone/>
+            <a:r>
+              <a:rPr lang="en-US" sz="2400" dirty="0"/>
+              <a:t>The least 4 </a:t>
+            </a:r>
+            <a:r>
+              <a:rPr lang="en-US" sz="2400" dirty="0" smtClean="0"/>
+              <a:t>industry:</a:t>
+            </a:r>
+          </a:p>
+          <a:p>
+            <a:pPr marL="914400" lvl="1" indent="-457200">
+              <a:buFont typeface="Arial" panose="020B0604020202020204" pitchFamily="34" charset="0"/>
+              <a:buChar char="•"/>
             </a:pPr>
             <a:r>
-              <a:rPr lang="en-US" b="1" dirty="0" smtClean="0"/>
-              <a:t>Request</a:t>
-            </a:r>
-            <a:r>
-              <a:rPr lang="en-US" dirty="0" smtClean="0"/>
-              <a:t>: raw app activities/demand data for </a:t>
-            </a:r>
-            <a:r>
-              <a:rPr lang="en-US" i="1" dirty="0" smtClean="0"/>
-              <a:t>daily data</a:t>
-            </a:r>
-            <a:r>
-              <a:rPr lang="en-US" dirty="0" smtClean="0"/>
-              <a:t> and </a:t>
-            </a:r>
-            <a:r>
-              <a:rPr lang="en-US" i="1" dirty="0" smtClean="0"/>
-              <a:t>hourly data</a:t>
-            </a:r>
-            <a:r>
-              <a:rPr lang="en-US" dirty="0"/>
-              <a:t> </a:t>
-            </a:r>
-            <a:r>
-              <a:rPr lang="en-US" dirty="0" smtClean="0"/>
-              <a:t>from at least 2/15/2020 to present.</a:t>
-            </a:r>
-          </a:p>
-          <a:p>
-            <a:pPr marL="0" indent="0">
-              <a:buNone/>
+              <a:rPr lang="en-US" sz="2000" dirty="0"/>
+              <a:t>Management;</a:t>
+            </a:r>
+          </a:p>
+          <a:p>
+            <a:pPr marL="914400" lvl="1" indent="-457200">
+              <a:buFont typeface="Arial" panose="020B0604020202020204" pitchFamily="34" charset="0"/>
+              <a:buChar char="•"/>
             </a:pPr>
             <a:r>
-              <a:rPr lang="en-US" b="1" dirty="0" smtClean="0"/>
-              <a:t>Good to have</a:t>
-            </a:r>
-            <a:r>
-              <a:rPr lang="en-US" dirty="0" smtClean="0"/>
-              <a:t>: If possible, we also would like to request the same data for the same period in 2019 and 2018 for calibration purposes.</a:t>
-            </a:r>
+              <a:rPr lang="en-US" sz="2000" dirty="0"/>
+              <a:t>Architecture and engineering;</a:t>
+            </a:r>
+          </a:p>
+          <a:p>
+            <a:pPr marL="914400" lvl="1" indent="-457200">
+              <a:buFont typeface="Arial" panose="020B0604020202020204" pitchFamily="34" charset="0"/>
+              <a:buChar char="•"/>
+            </a:pPr>
+            <a:r>
+              <a:rPr lang="en-US" sz="2000" dirty="0"/>
+              <a:t>Legal;</a:t>
+            </a:r>
+          </a:p>
+          <a:p>
+            <a:pPr marL="914400" lvl="1" indent="-457200">
+              <a:buFont typeface="Arial" panose="020B0604020202020204" pitchFamily="34" charset="0"/>
+              <a:buChar char="•"/>
+            </a:pPr>
+            <a:r>
+              <a:rPr lang="en-US" sz="2000" dirty="0"/>
+              <a:t>Science.</a:t>
+            </a:r>
+            <a:endParaRPr lang="en-US" sz="2000" dirty="0"/>
           </a:p>
         </p:txBody>
       </p:sp>
     </p:spTree>
     <p:extLst>
       <p:ext uri="{BB962C8B-B14F-4D97-AF65-F5344CB8AC3E}">
-        <p14:creationId xmlns:p14="http://schemas.microsoft.com/office/powerpoint/2010/main" val="545249643"/>
+        <p14:creationId xmlns:p14="http://schemas.microsoft.com/office/powerpoint/2010/main" val="1415127452"/>
       </p:ext>
     </p:extLst>
   </p:cSld>
@@ -3299,12 +3366,8 @@
           <a:lstStyle/>
           <a:p>
             <a:r>
-              <a:rPr lang="en-US" dirty="0"/>
-              <a:t>H</a:t>
-            </a:r>
-            <a:r>
               <a:rPr lang="en-US" dirty="0" smtClean="0"/>
-              <a:t>ourly data?</a:t>
+              <a:t>Your race matters</a:t>
             </a:r>
             <a:endParaRPr lang="en-US" dirty="0"/>
           </a:p>
@@ -3320,51 +3383,127 @@
             <p:ph idx="1"/>
           </p:nvPr>
         </p:nvSpPr>
-        <p:spPr/>
-        <p:txBody>
-          <a:bodyPr/>
-          <a:lstStyle/>
-          <a:p>
+        <p:spPr>
+          <a:xfrm>
+            <a:off x="838200" y="1825625"/>
+            <a:ext cx="5305926" cy="4351338"/>
+          </a:xfrm>
+        </p:spPr>
+        <p:txBody>
+          <a:bodyPr>
+            <a:normAutofit fontScale="92500"/>
+          </a:bodyPr>
+          <a:lstStyle/>
+          <a:p>
+            <a:pPr marL="0" indent="0">
+              <a:buNone/>
+            </a:pPr>
             <a:r>
               <a:rPr lang="en-US" dirty="0" smtClean="0"/>
-              <a:t>Current can only traced back to 3/7/2020.</a:t>
-            </a:r>
+              <a:t>From our research:</a:t>
+            </a:r>
+          </a:p>
+          <a:p>
+            <a:r>
+              <a:rPr lang="en-US" dirty="0" smtClean="0"/>
+              <a:t>A city’s demand decrease level is correlated with ratio of African American and Hispanic population.</a:t>
+            </a:r>
+          </a:p>
+          <a:p>
+            <a:r>
+              <a:rPr lang="en-US" dirty="0" smtClean="0"/>
+              <a:t>Cities with </a:t>
+            </a:r>
+            <a:r>
+              <a:rPr lang="en-US" dirty="0" smtClean="0">
+                <a:solidFill>
+                  <a:srgbClr val="FF0000"/>
+                </a:solidFill>
+              </a:rPr>
+              <a:t>more</a:t>
+            </a:r>
+            <a:r>
+              <a:rPr lang="en-US" dirty="0" smtClean="0"/>
+              <a:t> African American / Hispanic population are likely to have a </a:t>
+            </a:r>
+            <a:r>
+              <a:rPr lang="en-US" dirty="0" smtClean="0">
+                <a:solidFill>
+                  <a:srgbClr val="FF0000"/>
+                </a:solidFill>
+              </a:rPr>
+              <a:t>higher</a:t>
+            </a:r>
+            <a:r>
+              <a:rPr lang="en-US" dirty="0" smtClean="0"/>
+              <a:t> floor value.</a:t>
+            </a:r>
+          </a:p>
+          <a:p>
+            <a:pPr marL="0" indent="0">
+              <a:buNone/>
+            </a:pPr>
             <a:endParaRPr lang="en-US" dirty="0"/>
           </a:p>
           <a:p>
+            <a:pPr marL="0" indent="0">
+              <a:buNone/>
+            </a:pPr>
             <a:r>
               <a:rPr lang="en-US" dirty="0" smtClean="0"/>
-              <a:t>Seattle already witness decrease from 2/18/2020.</a:t>
+              <a:t>From the survey:</a:t>
             </a:r>
           </a:p>
           <a:p>
             <a:endParaRPr lang="en-US" dirty="0"/>
           </a:p>
-          <a:p>
-            <a:endParaRPr lang="en-US" dirty="0" smtClean="0"/>
-          </a:p>
-          <a:p>
-            <a:endParaRPr lang="en-US" dirty="0"/>
-          </a:p>
-          <a:p>
-            <a:pPr marL="0" indent="0">
-              <a:buNone/>
-            </a:pPr>
-            <a:r>
-              <a:rPr lang="en-US" b="1" dirty="0" smtClean="0"/>
-              <a:t>Request</a:t>
-            </a:r>
-            <a:r>
-              <a:rPr lang="en-US" dirty="0" smtClean="0"/>
-              <a:t>: hourly app activities/demand data from at least 2/15/2020. </a:t>
-            </a:r>
-          </a:p>
-        </p:txBody>
-      </p:sp>
+        </p:txBody>
+      </p:sp>
+      <p:pic>
+        <p:nvPicPr>
+          <p:cNvPr id="1026" name="Picture 2" descr="https://miro.medium.com/max/4080/1*sdo8aCUUs4vlDpzHe-I8iA.png"/>
+          <p:cNvPicPr>
+            <a:picLocks noChangeAspect="1" noChangeArrowheads="1"/>
+          </p:cNvPicPr>
+          <p:nvPr/>
+        </p:nvPicPr>
+        <p:blipFill>
+          <a:blip r:embed="rId2" cstate="print">
+            <a:extLst>
+              <a:ext uri="{28A0092B-C50C-407E-A947-70E740481C1C}">
+                <a14:useLocalDpi xmlns:a14="http://schemas.microsoft.com/office/drawing/2010/main" val="0"/>
+              </a:ext>
+            </a:extLst>
+          </a:blip>
+          <a:srcRect/>
+          <a:stretch>
+            <a:fillRect/>
+          </a:stretch>
+        </p:blipFill>
+        <p:spPr bwMode="auto">
+          <a:xfrm>
+            <a:off x="5451849" y="772737"/>
+            <a:ext cx="6996301" cy="5932863"/>
+          </a:xfrm>
+          <a:prstGeom prst="rect">
+            <a:avLst/>
+          </a:prstGeom>
+          <a:noFill/>
+          <a:extLst>
+            <a:ext uri="{909E8E84-426E-40DD-AFC4-6F175D3DCCD1}">
+              <a14:hiddenFill xmlns:a14="http://schemas.microsoft.com/office/drawing/2010/main">
+                <a:solidFill>
+                  <a:srgbClr val="FFFFFF"/>
+                </a:solidFill>
+              </a14:hiddenFill>
+            </a:ext>
+          </a:extLst>
+        </p:spPr>
+      </p:pic>
     </p:spTree>
     <p:extLst>
       <p:ext uri="{BB962C8B-B14F-4D97-AF65-F5344CB8AC3E}">
-        <p14:creationId xmlns:p14="http://schemas.microsoft.com/office/powerpoint/2010/main" val="2334180878"/>
+        <p14:creationId xmlns:p14="http://schemas.microsoft.com/office/powerpoint/2010/main" val="2612894327"/>
       </p:ext>
     </p:extLst>
   </p:cSld>
@@ -3408,7 +3547,7 @@
           <a:p>
             <a:r>
               <a:rPr lang="en-US" dirty="0" smtClean="0"/>
-              <a:t>Local-scale data</a:t>
+              <a:t>Your sex/gender matters</a:t>
             </a:r>
             <a:endParaRPr lang="en-US" dirty="0"/>
           </a:p>
@@ -3426,77 +3565,71 @@
         </p:nvSpPr>
         <p:spPr/>
         <p:txBody>
-          <a:bodyPr>
-            <a:normAutofit lnSpcReduction="10000"/>
-          </a:bodyPr>
-          <a:lstStyle/>
-          <a:p>
+          <a:bodyPr/>
+          <a:lstStyle/>
+          <a:p>
+            <a:pPr marL="0" indent="0">
+              <a:buNone/>
+            </a:pPr>
             <a:r>
               <a:rPr lang="en-US" dirty="0" smtClean="0"/>
-              <a:t>Mobility dynamics change analyses concentrating </a:t>
-            </a:r>
+              <a:t>From our research: If a city has larger female ratio, the floor value is  very likely to have a higher floor value.</a:t>
+            </a:r>
+          </a:p>
+          <a:p>
+            <a:pPr marL="0" indent="0">
+              <a:buNone/>
+            </a:pPr>
+            <a:endParaRPr lang="en-US" dirty="0"/>
+          </a:p>
+          <a:p>
+            <a:pPr marL="0" indent="0">
+              <a:buNone/>
+            </a:pPr>
             <a:r>
               <a:rPr lang="en-US" dirty="0" smtClean="0"/>
-              <a:t>on</a:t>
-            </a:r>
+              <a:t>From the survey: transit female/male ratio change from 49%/49% to 56%/40%</a:t>
+            </a:r>
+          </a:p>
+          <a:p>
+            <a:pPr marL="0" indent="0">
+              <a:buNone/>
+            </a:pPr>
             <a:r>
               <a:rPr lang="en-US" dirty="0" smtClean="0"/>
-              <a:t> </a:t>
-            </a:r>
-            <a:r>
-              <a:rPr lang="en-US" b="1" dirty="0" smtClean="0"/>
-              <a:t>Columbus, Ohio</a:t>
+              <a:t>In cities like Philadelphia, </a:t>
+            </a:r>
+            <a:r>
+              <a:rPr lang="en-US" dirty="0" smtClean="0">
+                <a:solidFill>
+                  <a:srgbClr val="FF0000"/>
+                </a:solidFill>
+              </a:rPr>
+              <a:t>more than 68% of riders are women</a:t>
             </a:r>
             <a:r>
               <a:rPr lang="en-US" dirty="0" smtClean="0"/>
-              <a:t>;</a:t>
-            </a:r>
-          </a:p>
-          <a:p>
-            <a:r>
-              <a:rPr lang="en-US" dirty="0" smtClean="0"/>
-              <a:t>Higher resolution on local geographies: Parcels? </a:t>
-            </a:r>
-            <a:r>
-              <a:rPr lang="en-US" altLang="zh-CN" dirty="0" smtClean="0"/>
-              <a:t>Census tracts?</a:t>
-            </a:r>
-          </a:p>
-          <a:p>
+              <a:t>.</a:t>
+            </a:r>
+          </a:p>
+          <a:p>
+            <a:pPr marL="0" indent="0">
+              <a:buNone/>
+            </a:pPr>
+            <a:endParaRPr lang="en-US" dirty="0" smtClean="0"/>
+          </a:p>
+          <a:p>
+            <a:pPr marL="0" indent="0">
+              <a:buNone/>
+            </a:pPr>
             <a:endParaRPr lang="en-US" dirty="0"/>
-          </a:p>
-          <a:p>
-            <a:pPr marL="0" indent="0">
-              <a:buNone/>
-            </a:pPr>
-            <a:r>
-              <a:rPr lang="en-US" b="1" dirty="0" smtClean="0"/>
-              <a:t>Request</a:t>
-            </a:r>
-            <a:r>
-              <a:rPr lang="en-US" dirty="0" smtClean="0"/>
-              <a:t>: aggregated or anonymous app activities/demand data with higher spatial resolution (e.g. census tract) and higher temporal resolution (e.g. every 2 min) for the Franklin County, Ohio.</a:t>
-            </a:r>
-          </a:p>
-          <a:p>
-            <a:pPr marL="0" indent="0">
-              <a:buNone/>
-            </a:pPr>
-            <a:r>
-              <a:rPr lang="en-US" b="1" dirty="0" smtClean="0"/>
-              <a:t>Good to have</a:t>
-            </a:r>
-            <a:r>
-              <a:rPr lang="en-US" dirty="0" smtClean="0"/>
-              <a:t>: aggregated or anonymous trip data with higher spatial and temporal resolution; OD matrix of the same geographies and same time period.</a:t>
-            </a:r>
           </a:p>
         </p:txBody>
       </p:sp>
     </p:spTree>
     <p:extLst>
       <p:ext uri="{BB962C8B-B14F-4D97-AF65-F5344CB8AC3E}">
-        <p14:creationId xmlns:p14="http://schemas.microsoft.com/office/powerpoint/2010/main" val="3737836861"/>
+        <p14:creationId xmlns:p14="http://schemas.microsoft.com/office/powerpoint/2010/main" val="2158161282"/>
       </p:ext>
     </p:extLst>
   </p:cSld>
@@ -3540,7 +3673,7 @@
           <a:p>
             <a:r>
               <a:rPr lang="en-US" dirty="0" smtClean="0"/>
-              <a:t>Representativeness of transit app data?</a:t>
+              <a:t>Your preference does not matter</a:t>
             </a:r>
             <a:endParaRPr lang="en-US" dirty="0"/>
           </a:p>
@@ -3563,52 +3696,56 @@
           <a:p>
             <a:r>
               <a:rPr lang="en-US" dirty="0" smtClean="0"/>
-              <a:t>We collect 40 systems official ridership declining figures;</a:t>
+              <a:t>Social media and Google search statistics have no correlation with the floor value.</a:t>
             </a:r>
           </a:p>
           <a:p>
             <a:r>
               <a:rPr lang="en-US" dirty="0" smtClean="0"/>
-              <a:t>From local news and reports;</a:t>
-            </a:r>
+              <a:t>But Google search statistics are significantly correlated with the speed of the transit demand decrease.</a:t>
+            </a:r>
+          </a:p>
+          <a:p>
+            <a:endParaRPr lang="en-US" dirty="0"/>
           </a:p>
           <a:p>
             <a:r>
               <a:rPr lang="en-US" dirty="0" smtClean="0"/>
-              <a:t>Though no bias for T-Test with small sample size, still questionable. </a:t>
-            </a:r>
-          </a:p>
-          <a:p>
+              <a:t>The myth of “awareness”:</a:t>
+            </a:r>
+          </a:p>
+          <a:p>
+            <a:pPr lvl="1"/>
             <a:r>
               <a:rPr lang="en-US" dirty="0" smtClean="0"/>
-              <a:t>Average bias = 3.7%, Standard deviation = 15.96% (still large)</a:t>
-            </a:r>
-          </a:p>
-          <a:p>
-            <a:endParaRPr lang="en-US" dirty="0"/>
-          </a:p>
-          <a:p>
+              <a:t>Essential workers know, yet they still have to work;</a:t>
+            </a:r>
+          </a:p>
+          <a:p>
+            <a:pPr lvl="1"/>
+            <a:r>
+              <a:rPr lang="en-US" dirty="0" smtClean="0"/>
+              <a:t>Awareness is only relevant to those who </a:t>
+            </a:r>
+            <a:r>
+              <a:rPr lang="en-US" b="1" i="1" dirty="0" smtClean="0"/>
+              <a:t>can </a:t>
+            </a:r>
+            <a:r>
+              <a:rPr lang="en-US" dirty="0" smtClean="0"/>
+              <a:t>work from home.</a:t>
+            </a:r>
+          </a:p>
+          <a:p>
+            <a:pPr lvl="1"/>
             <a:endParaRPr lang="en-US" dirty="0" smtClean="0"/>
-          </a:p>
-          <a:p>
-            <a:pPr marL="0" indent="0">
-              <a:buNone/>
-            </a:pPr>
-            <a:r>
-              <a:rPr lang="en-US" b="1" dirty="0" smtClean="0"/>
-              <a:t>Good to have</a:t>
-            </a:r>
-            <a:r>
-              <a:rPr lang="en-US" dirty="0" smtClean="0"/>
-              <a:t>: Any further survey results on this issue? A good reference (like a Transit app blog?) will do.</a:t>
-            </a:r>
           </a:p>
         </p:txBody>
       </p:sp>
     </p:spTree>
     <p:extLst>
       <p:ext uri="{BB962C8B-B14F-4D97-AF65-F5344CB8AC3E}">
-        <p14:creationId xmlns:p14="http://schemas.microsoft.com/office/powerpoint/2010/main" val="4106037173"/>
+        <p14:creationId xmlns:p14="http://schemas.microsoft.com/office/powerpoint/2010/main" val="3152127156"/>
       </p:ext>
     </p:extLst>
   </p:cSld>
@@ -3652,7 +3789,7 @@
           <a:p>
             <a:r>
               <a:rPr lang="en-US" dirty="0" smtClean="0"/>
-              <a:t>Future: more data, more analyses</a:t>
+              <a:t>Who is the essential workers again?</a:t>
             </a:r>
             <a:endParaRPr lang="en-US" dirty="0"/>
           </a:p>
@@ -3673,53 +3810,402 @@
           <a:bodyPr/>
           <a:lstStyle/>
           <a:p>
-            <a:r>
-              <a:rPr lang="en-US" dirty="0"/>
-              <a:t>Hourly </a:t>
-            </a:r>
-            <a:r>
-              <a:rPr lang="en-US" dirty="0" smtClean="0"/>
-              <a:t>analysis</a:t>
-            </a:r>
-          </a:p>
-          <a:p>
-            <a:pPr lvl="1"/>
-            <a:r>
-              <a:rPr lang="en-US" dirty="0" smtClean="0"/>
-              <a:t>Shape similarity before and after: </a:t>
-            </a:r>
-            <a:r>
-              <a:rPr lang="en-US" dirty="0"/>
-              <a:t>different city types</a:t>
-            </a:r>
-            <a:r>
-              <a:rPr lang="en-US" dirty="0" smtClean="0"/>
-              <a:t>.</a:t>
-            </a:r>
-          </a:p>
-          <a:p>
-            <a:pPr lvl="1"/>
-            <a:r>
-              <a:rPr lang="en-US" altLang="zh-CN" dirty="0" smtClean="0"/>
-              <a:t>Distance between curves before and after.</a:t>
-            </a:r>
-          </a:p>
-          <a:p>
-            <a:endParaRPr lang="en-US" dirty="0"/>
-          </a:p>
-          <a:p>
-            <a:r>
-              <a:rPr lang="en-US" dirty="0" smtClean="0"/>
-              <a:t>Weekday analysis.</a:t>
-            </a:r>
-            <a:endParaRPr lang="en-US" dirty="0"/>
-          </a:p>
-        </p:txBody>
-      </p:sp>
+            <a:endParaRPr lang="en-US"/>
+          </a:p>
+        </p:txBody>
+      </p:sp>
+      <p:pic>
+        <p:nvPicPr>
+          <p:cNvPr id="2050" name="Picture 2" descr="Protests over coronavirus orders started with fringe groups, but ..."/>
+          <p:cNvPicPr>
+            <a:picLocks noChangeAspect="1" noChangeArrowheads="1"/>
+          </p:cNvPicPr>
+          <p:nvPr/>
+        </p:nvPicPr>
+        <p:blipFill>
+          <a:blip r:embed="rId2" cstate="print">
+            <a:extLst>
+              <a:ext uri="{28A0092B-C50C-407E-A947-70E740481C1C}">
+                <a14:useLocalDpi xmlns:a14="http://schemas.microsoft.com/office/drawing/2010/main" val="0"/>
+              </a:ext>
+            </a:extLst>
+          </a:blip>
+          <a:srcRect/>
+          <a:stretch>
+            <a:fillRect/>
+          </a:stretch>
+        </p:blipFill>
+        <p:spPr bwMode="auto">
+          <a:xfrm>
+            <a:off x="3348163" y="2031518"/>
+            <a:ext cx="5495674" cy="3939551"/>
+          </a:xfrm>
+          <a:prstGeom prst="rect">
+            <a:avLst/>
+          </a:prstGeom>
+          <a:noFill/>
+          <a:extLst>
+            <a:ext uri="{909E8E84-426E-40DD-AFC4-6F175D3DCCD1}">
+              <a14:hiddenFill xmlns:a14="http://schemas.microsoft.com/office/drawing/2010/main">
+                <a:solidFill>
+                  <a:srgbClr val="FFFFFF"/>
+                </a:solidFill>
+              </a14:hiddenFill>
+            </a:ext>
+          </a:extLst>
+        </p:spPr>
+      </p:pic>
     </p:spTree>
     <p:extLst>
       <p:ext uri="{BB962C8B-B14F-4D97-AF65-F5344CB8AC3E}">
-        <p14:creationId xmlns:p14="http://schemas.microsoft.com/office/powerpoint/2010/main" val="1442149286"/>
+        <p14:creationId xmlns:p14="http://schemas.microsoft.com/office/powerpoint/2010/main" val="3743289153"/>
+      </p:ext>
+    </p:extLst>
+  </p:cSld>
+  <p:clrMapOvr>
+    <a:masterClrMapping/>
+  </p:clrMapOvr>
+</p:sld>
+</file>
+
+<file path=ppt/slides/slide15.xml><?xml version="1.0" encoding="utf-8"?>
+<p:sld xmlns:a="http://schemas.openxmlformats.org/drawingml/2006/main" xmlns:r="http://schemas.openxmlformats.org/officeDocument/2006/relationships" xmlns:p="http://schemas.openxmlformats.org/presentationml/2006/main">
+  <p:cSld>
+    <p:spTree>
+      <p:nvGrpSpPr>
+        <p:cNvPr id="1" name=""/>
+        <p:cNvGrpSpPr/>
+        <p:nvPr/>
+      </p:nvGrpSpPr>
+      <p:grpSpPr>
+        <a:xfrm>
+          <a:off x="0" y="0"/>
+          <a:ext cx="0" cy="0"/>
+          <a:chOff x="0" y="0"/>
+          <a:chExt cx="0" cy="0"/>
+        </a:xfrm>
+      </p:grpSpPr>
+      <p:sp>
+        <p:nvSpPr>
+          <p:cNvPr id="2" name="Title 1"/>
+          <p:cNvSpPr>
+            <a:spLocks noGrp="1"/>
+          </p:cNvSpPr>
+          <p:nvPr>
+            <p:ph type="title"/>
+          </p:nvPr>
+        </p:nvSpPr>
+        <p:spPr/>
+        <p:txBody>
+          <a:bodyPr/>
+          <a:lstStyle/>
+          <a:p>
+            <a:r>
+              <a:rPr lang="en-US" dirty="0"/>
+              <a:t>Peaks and commuting</a:t>
+            </a:r>
+          </a:p>
+        </p:txBody>
+      </p:sp>
+      <p:sp>
+        <p:nvSpPr>
+          <p:cNvPr id="3" name="Text Placeholder 2"/>
+          <p:cNvSpPr>
+            <a:spLocks noGrp="1"/>
+          </p:cNvSpPr>
+          <p:nvPr>
+            <p:ph type="body" idx="1"/>
+          </p:nvPr>
+        </p:nvSpPr>
+        <p:spPr/>
+        <p:txBody>
+          <a:bodyPr/>
+          <a:lstStyle/>
+          <a:p>
+            <a:endParaRPr lang="en-US"/>
+          </a:p>
+        </p:txBody>
+      </p:sp>
+    </p:spTree>
+    <p:extLst>
+      <p:ext uri="{BB962C8B-B14F-4D97-AF65-F5344CB8AC3E}">
+        <p14:creationId xmlns:p14="http://schemas.microsoft.com/office/powerpoint/2010/main" val="3152652828"/>
+      </p:ext>
+    </p:extLst>
+  </p:cSld>
+  <p:clrMapOvr>
+    <a:masterClrMapping/>
+  </p:clrMapOvr>
+</p:sld>
+</file>
+
+<file path=ppt/slides/slide16.xml><?xml version="1.0" encoding="utf-8"?>
+<p:sld xmlns:a="http://schemas.openxmlformats.org/drawingml/2006/main" xmlns:r="http://schemas.openxmlformats.org/officeDocument/2006/relationships" xmlns:p="http://schemas.openxmlformats.org/presentationml/2006/main">
+  <p:cSld>
+    <p:spTree>
+      <p:nvGrpSpPr>
+        <p:cNvPr id="1" name=""/>
+        <p:cNvGrpSpPr/>
+        <p:nvPr/>
+      </p:nvGrpSpPr>
+      <p:grpSpPr>
+        <a:xfrm>
+          <a:off x="0" y="0"/>
+          <a:ext cx="0" cy="0"/>
+          <a:chOff x="0" y="0"/>
+          <a:chExt cx="0" cy="0"/>
+        </a:xfrm>
+      </p:grpSpPr>
+      <p:sp>
+        <p:nvSpPr>
+          <p:cNvPr id="2" name="Title 1"/>
+          <p:cNvSpPr>
+            <a:spLocks noGrp="1"/>
+          </p:cNvSpPr>
+          <p:nvPr>
+            <p:ph type="title"/>
+          </p:nvPr>
+        </p:nvSpPr>
+        <p:spPr/>
+        <p:txBody>
+          <a:bodyPr/>
+          <a:lstStyle/>
+          <a:p>
+            <a:endParaRPr lang="en-US"/>
+          </a:p>
+        </p:txBody>
+      </p:sp>
+      <p:sp>
+        <p:nvSpPr>
+          <p:cNvPr id="3" name="Content Placeholder 2"/>
+          <p:cNvSpPr>
+            <a:spLocks noGrp="1"/>
+          </p:cNvSpPr>
+          <p:nvPr>
+            <p:ph idx="1"/>
+          </p:nvPr>
+        </p:nvSpPr>
+        <p:spPr/>
+        <p:txBody>
+          <a:bodyPr/>
+          <a:lstStyle/>
+          <a:p>
+            <a:endParaRPr lang="en-US"/>
+          </a:p>
+        </p:txBody>
+      </p:sp>
+      <p:pic>
+        <p:nvPicPr>
+          <p:cNvPr id="5" name="Picture 4"/>
+          <p:cNvPicPr>
+            <a:picLocks noChangeAspect="1"/>
+          </p:cNvPicPr>
+          <p:nvPr/>
+        </p:nvPicPr>
+        <p:blipFill>
+          <a:blip r:embed="rId2"/>
+          <a:stretch>
+            <a:fillRect/>
+          </a:stretch>
+        </p:blipFill>
+        <p:spPr>
+          <a:xfrm>
+            <a:off x="657957" y="156412"/>
+            <a:ext cx="10876085" cy="6701588"/>
+          </a:xfrm>
+          <a:prstGeom prst="rect">
+            <a:avLst/>
+          </a:prstGeom>
+        </p:spPr>
+      </p:pic>
+    </p:spTree>
+    <p:extLst>
+      <p:ext uri="{BB962C8B-B14F-4D97-AF65-F5344CB8AC3E}">
+        <p14:creationId xmlns:p14="http://schemas.microsoft.com/office/powerpoint/2010/main" val="3529332128"/>
+      </p:ext>
+    </p:extLst>
+  </p:cSld>
+  <p:clrMapOvr>
+    <a:masterClrMapping/>
+  </p:clrMapOvr>
+</p:sld>
+</file>
+
+<file path=ppt/slides/slide17.xml><?xml version="1.0" encoding="utf-8"?>
+<p:sld xmlns:a="http://schemas.openxmlformats.org/drawingml/2006/main" xmlns:r="http://schemas.openxmlformats.org/officeDocument/2006/relationships" xmlns:p="http://schemas.openxmlformats.org/presentationml/2006/main">
+  <p:cSld>
+    <p:spTree>
+      <p:nvGrpSpPr>
+        <p:cNvPr id="1" name=""/>
+        <p:cNvGrpSpPr/>
+        <p:nvPr/>
+      </p:nvGrpSpPr>
+      <p:grpSpPr>
+        <a:xfrm>
+          <a:off x="0" y="0"/>
+          <a:ext cx="0" cy="0"/>
+          <a:chOff x="0" y="0"/>
+          <a:chExt cx="0" cy="0"/>
+        </a:xfrm>
+      </p:grpSpPr>
+      <p:sp>
+        <p:nvSpPr>
+          <p:cNvPr id="2" name="Title 1"/>
+          <p:cNvSpPr>
+            <a:spLocks noGrp="1"/>
+          </p:cNvSpPr>
+          <p:nvPr>
+            <p:ph type="title"/>
+          </p:nvPr>
+        </p:nvSpPr>
+        <p:spPr/>
+        <p:txBody>
+          <a:bodyPr/>
+          <a:lstStyle/>
+          <a:p>
+            <a:endParaRPr lang="en-US"/>
+          </a:p>
+        </p:txBody>
+      </p:sp>
+      <p:sp>
+        <p:nvSpPr>
+          <p:cNvPr id="3" name="Content Placeholder 2"/>
+          <p:cNvSpPr>
+            <a:spLocks noGrp="1"/>
+          </p:cNvSpPr>
+          <p:nvPr>
+            <p:ph idx="1"/>
+          </p:nvPr>
+        </p:nvSpPr>
+        <p:spPr/>
+        <p:txBody>
+          <a:bodyPr/>
+          <a:lstStyle/>
+          <a:p>
+            <a:endParaRPr lang="en-US"/>
+          </a:p>
+        </p:txBody>
+      </p:sp>
+      <p:pic>
+        <p:nvPicPr>
+          <p:cNvPr id="4" name="Picture 3"/>
+          <p:cNvPicPr>
+            <a:picLocks noChangeAspect="1"/>
+          </p:cNvPicPr>
+          <p:nvPr/>
+        </p:nvPicPr>
+        <p:blipFill>
+          <a:blip r:embed="rId2"/>
+          <a:stretch>
+            <a:fillRect/>
+          </a:stretch>
+        </p:blipFill>
+        <p:spPr>
+          <a:xfrm>
+            <a:off x="657225" y="0"/>
+            <a:ext cx="10877550" cy="6802480"/>
+          </a:xfrm>
+          <a:prstGeom prst="rect">
+            <a:avLst/>
+          </a:prstGeom>
+        </p:spPr>
+      </p:pic>
+    </p:spTree>
+    <p:extLst>
+      <p:ext uri="{BB962C8B-B14F-4D97-AF65-F5344CB8AC3E}">
+        <p14:creationId xmlns:p14="http://schemas.microsoft.com/office/powerpoint/2010/main" val="819518543"/>
+      </p:ext>
+    </p:extLst>
+  </p:cSld>
+  <p:clrMapOvr>
+    <a:masterClrMapping/>
+  </p:clrMapOvr>
+</p:sld>
+</file>
+
+<file path=ppt/slides/slide18.xml><?xml version="1.0" encoding="utf-8"?>
+<p:sld xmlns:a="http://schemas.openxmlformats.org/drawingml/2006/main" xmlns:r="http://schemas.openxmlformats.org/officeDocument/2006/relationships" xmlns:p="http://schemas.openxmlformats.org/presentationml/2006/main">
+  <p:cSld>
+    <p:spTree>
+      <p:nvGrpSpPr>
+        <p:cNvPr id="1" name=""/>
+        <p:cNvGrpSpPr/>
+        <p:nvPr/>
+      </p:nvGrpSpPr>
+      <p:grpSpPr>
+        <a:xfrm>
+          <a:off x="0" y="0"/>
+          <a:ext cx="0" cy="0"/>
+          <a:chOff x="0" y="0"/>
+          <a:chExt cx="0" cy="0"/>
+        </a:xfrm>
+      </p:grpSpPr>
+      <p:sp>
+        <p:nvSpPr>
+          <p:cNvPr id="2" name="Title 1"/>
+          <p:cNvSpPr>
+            <a:spLocks noGrp="1"/>
+          </p:cNvSpPr>
+          <p:nvPr>
+            <p:ph type="title"/>
+          </p:nvPr>
+        </p:nvSpPr>
+        <p:spPr/>
+        <p:txBody>
+          <a:bodyPr/>
+          <a:lstStyle/>
+          <a:p>
+            <a:endParaRPr lang="en-US"/>
+          </a:p>
+        </p:txBody>
+      </p:sp>
+      <p:sp>
+        <p:nvSpPr>
+          <p:cNvPr id="3" name="Content Placeholder 2"/>
+          <p:cNvSpPr>
+            <a:spLocks noGrp="1"/>
+          </p:cNvSpPr>
+          <p:nvPr>
+            <p:ph idx="1"/>
+          </p:nvPr>
+        </p:nvSpPr>
+        <p:spPr/>
+        <p:txBody>
+          <a:bodyPr/>
+          <a:lstStyle/>
+          <a:p>
+            <a:endParaRPr lang="en-US"/>
+          </a:p>
+        </p:txBody>
+      </p:sp>
+      <p:pic>
+        <p:nvPicPr>
+          <p:cNvPr id="4" name="Picture 3"/>
+          <p:cNvPicPr>
+            <a:picLocks noChangeAspect="1"/>
+          </p:cNvPicPr>
+          <p:nvPr/>
+        </p:nvPicPr>
+        <p:blipFill>
+          <a:blip r:embed="rId2"/>
+          <a:stretch>
+            <a:fillRect/>
+          </a:stretch>
+        </p:blipFill>
+        <p:spPr>
+          <a:xfrm>
+            <a:off x="609630" y="0"/>
+            <a:ext cx="10971180" cy="6858000"/>
+          </a:xfrm>
+          <a:prstGeom prst="rect">
+            <a:avLst/>
+          </a:prstGeom>
+        </p:spPr>
+      </p:pic>
+    </p:spTree>
+    <p:extLst>
+      <p:ext uri="{BB962C8B-B14F-4D97-AF65-F5344CB8AC3E}">
+        <p14:creationId xmlns:p14="http://schemas.microsoft.com/office/powerpoint/2010/main" val="342800708"/>
       </p:ext>
     </p:extLst>
   </p:cSld>
@@ -3730,6 +4216,125 @@
 </file>
 
 <file path=ppt/slides/slide2.xml><?xml version="1.0" encoding="utf-8"?>
+<p:sld xmlns:a="http://schemas.openxmlformats.org/drawingml/2006/main" xmlns:r="http://schemas.openxmlformats.org/officeDocument/2006/relationships" xmlns:p="http://schemas.openxmlformats.org/presentationml/2006/main">
+  <p:cSld>
+    <p:spTree>
+      <p:nvGrpSpPr>
+        <p:cNvPr id="1" name=""/>
+        <p:cNvGrpSpPr/>
+        <p:nvPr/>
+      </p:nvGrpSpPr>
+      <p:grpSpPr>
+        <a:xfrm>
+          <a:off x="0" y="0"/>
+          <a:ext cx="0" cy="0"/>
+          <a:chOff x="0" y="0"/>
+          <a:chExt cx="0" cy="0"/>
+        </a:xfrm>
+      </p:grpSpPr>
+      <p:sp>
+        <p:nvSpPr>
+          <p:cNvPr id="2" name="Title 1"/>
+          <p:cNvSpPr>
+            <a:spLocks noGrp="1"/>
+          </p:cNvSpPr>
+          <p:nvPr>
+            <p:ph type="title"/>
+          </p:nvPr>
+        </p:nvSpPr>
+        <p:spPr/>
+        <p:txBody>
+          <a:bodyPr/>
+          <a:lstStyle/>
+          <a:p>
+            <a:r>
+              <a:rPr lang="en-US" dirty="0" smtClean="0"/>
+              <a:t>Data – </a:t>
+            </a:r>
+            <a:r>
+              <a:rPr lang="en-US" dirty="0" smtClean="0">
+                <a:solidFill>
+                  <a:srgbClr val="FF0000"/>
+                </a:solidFill>
+              </a:rPr>
+              <a:t>transit demand</a:t>
+            </a:r>
+            <a:endParaRPr lang="en-US" dirty="0">
+              <a:solidFill>
+                <a:srgbClr val="FF0000"/>
+              </a:solidFill>
+            </a:endParaRPr>
+          </a:p>
+        </p:txBody>
+      </p:sp>
+      <p:sp>
+        <p:nvSpPr>
+          <p:cNvPr id="3" name="Content Placeholder 2"/>
+          <p:cNvSpPr>
+            <a:spLocks noGrp="1"/>
+          </p:cNvSpPr>
+          <p:nvPr>
+            <p:ph idx="1"/>
+          </p:nvPr>
+        </p:nvSpPr>
+        <p:spPr/>
+        <p:txBody>
+          <a:bodyPr/>
+          <a:lstStyle/>
+          <a:p>
+            <a:r>
+              <a:rPr lang="en-US" dirty="0" smtClean="0">
+                <a:solidFill>
+                  <a:srgbClr val="FF0000"/>
+                </a:solidFill>
+              </a:rPr>
+              <a:t>Indicates how many people opened the Transit app in a single day;</a:t>
+            </a:r>
+          </a:p>
+          <a:p>
+            <a:r>
+              <a:rPr lang="en-US" dirty="0" smtClean="0"/>
+              <a:t>Using the app is highly correlated with the actual ridership.</a:t>
+            </a:r>
+          </a:p>
+          <a:p>
+            <a:endParaRPr lang="en-US" dirty="0" smtClean="0"/>
+          </a:p>
+          <a:p>
+            <a:r>
+              <a:rPr lang="en-US" dirty="0" smtClean="0"/>
+              <a:t>Mobile </a:t>
+            </a:r>
+            <a:r>
+              <a:rPr lang="en-US" dirty="0"/>
+              <a:t>phone data: public dataset from Transit app;</a:t>
+            </a:r>
+          </a:p>
+          <a:p>
+            <a:r>
+              <a:rPr lang="en-US" dirty="0"/>
+              <a:t>For 113 transit systems in 70 cities in the US, including Columbus and COTA.</a:t>
+            </a:r>
+          </a:p>
+          <a:p>
+            <a:endParaRPr lang="en-US" dirty="0" smtClean="0"/>
+          </a:p>
+        </p:txBody>
+      </p:sp>
+    </p:spTree>
+    <p:extLst>
+      <p:ext uri="{BB962C8B-B14F-4D97-AF65-F5344CB8AC3E}">
+        <p14:creationId xmlns:p14="http://schemas.microsoft.com/office/powerpoint/2010/main" val="3542309161"/>
+      </p:ext>
+    </p:extLst>
+  </p:cSld>
+  <p:clrMapOvr>
+    <a:masterClrMapping/>
+  </p:clrMapOvr>
+</p:sld>
+</file>
+
+<file path=ppt/slides/slide3.xml><?xml version="1.0" encoding="utf-8"?>
 <p:sld xmlns:a="http://schemas.openxmlformats.org/drawingml/2006/main" xmlns:r="http://schemas.openxmlformats.org/officeDocument/2006/relationships" xmlns:p="http://schemas.openxmlformats.org/presentationml/2006/main">
   <p:cSld>
     <p:spTree>
@@ -3812,7 +4417,7 @@
 </p:sld>
 </file>
 
-<file path=ppt/slides/slide3.xml><?xml version="1.0" encoding="utf-8"?>
+<file path=ppt/slides/slide4.xml><?xml version="1.0" encoding="utf-8"?>
 <p:sld xmlns:a="http://schemas.openxmlformats.org/drawingml/2006/main" xmlns:r="http://schemas.openxmlformats.org/officeDocument/2006/relationships" xmlns:p="http://schemas.openxmlformats.org/presentationml/2006/main">
   <p:cSld>
     <p:spTree>
@@ -4308,6 +4913,72 @@
           </a:xfrm>
         </p:spPr>
       </p:pic>
+      <p:sp>
+        <p:nvSpPr>
+          <p:cNvPr id="3" name="Right Brace 2"/>
+          <p:cNvSpPr/>
+          <p:nvPr/>
+        </p:nvSpPr>
+        <p:spPr>
+          <a:xfrm>
+            <a:off x="5124850" y="2865389"/>
+            <a:ext cx="311123" cy="2342147"/>
+          </a:xfrm>
+          <a:prstGeom prst="rightBrace">
+            <a:avLst/>
+          </a:prstGeom>
+        </p:spPr>
+        <p:style>
+          <a:lnRef idx="1">
+            <a:schemeClr val="accent1"/>
+          </a:lnRef>
+          <a:fillRef idx="0">
+            <a:schemeClr val="accent1"/>
+          </a:fillRef>
+          <a:effectRef idx="0">
+            <a:schemeClr val="accent1"/>
+          </a:effectRef>
+          <a:fontRef idx="minor">
+            <a:schemeClr val="tx1"/>
+          </a:fontRef>
+        </p:style>
+        <p:txBody>
+          <a:bodyPr rtlCol="0" anchor="ctr"/>
+          <a:lstStyle/>
+          <a:p>
+            <a:pPr algn="ctr"/>
+            <a:endParaRPr lang="en-US"/>
+          </a:p>
+        </p:txBody>
+      </p:sp>
+      <p:sp>
+        <p:nvSpPr>
+          <p:cNvPr id="4" name="Rectangle 3"/>
+          <p:cNvSpPr/>
+          <p:nvPr/>
+        </p:nvSpPr>
+        <p:spPr>
+          <a:xfrm>
+            <a:off x="5485192" y="3851796"/>
+            <a:ext cx="1221616" cy="369332"/>
+          </a:xfrm>
+          <a:prstGeom prst="rect">
+            <a:avLst/>
+          </a:prstGeom>
+        </p:spPr>
+        <p:txBody>
+          <a:bodyPr wrap="none">
+            <a:spAutoFit/>
+          </a:bodyPr>
+          <a:lstStyle/>
+          <a:p>
+            <a:r>
+              <a:rPr lang="en-US" dirty="0"/>
+              <a:t>Floor value</a:t>
+            </a:r>
+          </a:p>
+        </p:txBody>
+      </p:sp>
     </p:spTree>
     <p:extLst>
       <p:ext uri="{BB962C8B-B14F-4D97-AF65-F5344CB8AC3E}">
@@ -4321,7 +4992,298 @@
 </p:sld>
 </file>
 
-<file path=ppt/slides/slide4.xml><?xml version="1.0" encoding="utf-8"?>
+<file path=ppt/slides/slide5.xml><?xml version="1.0" encoding="utf-8"?>
+<p:sld xmlns:a="http://schemas.openxmlformats.org/drawingml/2006/main" xmlns:r="http://schemas.openxmlformats.org/officeDocument/2006/relationships" xmlns:p="http://schemas.openxmlformats.org/presentationml/2006/main">
+  <p:cSld>
+    <p:spTree>
+      <p:nvGrpSpPr>
+        <p:cNvPr id="1" name=""/>
+        <p:cNvGrpSpPr/>
+        <p:nvPr/>
+      </p:nvGrpSpPr>
+      <p:grpSpPr>
+        <a:xfrm>
+          <a:off x="0" y="0"/>
+          <a:ext cx="0" cy="0"/>
+          <a:chOff x="0" y="0"/>
+          <a:chExt cx="0" cy="0"/>
+        </a:xfrm>
+      </p:grpSpPr>
+      <p:sp>
+        <p:nvSpPr>
+          <p:cNvPr id="2" name="Title 1"/>
+          <p:cNvSpPr>
+            <a:spLocks noGrp="1"/>
+          </p:cNvSpPr>
+          <p:nvPr>
+            <p:ph type="title"/>
+          </p:nvPr>
+        </p:nvSpPr>
+        <p:spPr/>
+        <p:txBody>
+          <a:bodyPr/>
+          <a:lstStyle/>
+          <a:p>
+            <a:r>
+              <a:rPr lang="en-US" dirty="0" smtClean="0"/>
+              <a:t>Floor value</a:t>
+            </a:r>
+            <a:endParaRPr lang="en-US" dirty="0"/>
+          </a:p>
+        </p:txBody>
+      </p:sp>
+      <p:sp>
+        <p:nvSpPr>
+          <p:cNvPr id="3" name="Content Placeholder 2"/>
+          <p:cNvSpPr>
+            <a:spLocks noGrp="1"/>
+          </p:cNvSpPr>
+          <p:nvPr>
+            <p:ph idx="1"/>
+          </p:nvPr>
+        </p:nvSpPr>
+        <p:spPr/>
+        <p:txBody>
+          <a:bodyPr>
+            <a:normAutofit lnSpcReduction="10000"/>
+          </a:bodyPr>
+          <a:lstStyle/>
+          <a:p>
+            <a:pPr marL="285750" indent="-285750"/>
+            <a:r>
+              <a:rPr lang="en-US" dirty="0"/>
+              <a:t>What is the base level of patronage during this crisis? </a:t>
+            </a:r>
+            <a:endParaRPr lang="en-US" dirty="0" smtClean="0"/>
+          </a:p>
+          <a:p>
+            <a:pPr marL="285750" indent="-285750"/>
+            <a:r>
+              <a:rPr lang="en-US" dirty="0" smtClean="0"/>
+              <a:t>Or: how many people stopped to use transit during this pandemic?</a:t>
+            </a:r>
+          </a:p>
+          <a:p>
+            <a:pPr marL="285750" indent="-285750"/>
+            <a:r>
+              <a:rPr lang="en-US" dirty="0" smtClean="0"/>
+              <a:t>Or: how many people continued to use transit?</a:t>
+            </a:r>
+            <a:endParaRPr lang="en-US" dirty="0"/>
+          </a:p>
+          <a:p>
+            <a:pPr marL="285750" indent="-285750"/>
+            <a:endParaRPr lang="en-US" dirty="0"/>
+          </a:p>
+          <a:p>
+            <a:pPr marL="285750" indent="-285750"/>
+            <a:r>
+              <a:rPr lang="en-US" dirty="0"/>
+              <a:t>Does this vary by city?</a:t>
+            </a:r>
+          </a:p>
+          <a:p>
+            <a:pPr marL="285750" indent="-285750"/>
+            <a:endParaRPr lang="en-US" dirty="0"/>
+          </a:p>
+          <a:p>
+            <a:pPr marL="285750" indent="-285750"/>
+            <a:r>
+              <a:rPr lang="en-US" dirty="0"/>
+              <a:t>What explains this variation:</a:t>
+            </a:r>
+          </a:p>
+          <a:p>
+            <a:pPr marL="742950" lvl="1" indent="-285750"/>
+            <a:r>
+              <a:rPr lang="en-US" dirty="0"/>
+              <a:t>Transit dependence?</a:t>
+            </a:r>
+          </a:p>
+          <a:p>
+            <a:pPr marL="742950" lvl="1" indent="-285750"/>
+            <a:r>
+              <a:rPr lang="en-US" dirty="0"/>
+              <a:t>Jobs mix?</a:t>
+            </a:r>
+          </a:p>
+          <a:p>
+            <a:pPr marL="742950" lvl="1" indent="-285750"/>
+            <a:r>
+              <a:rPr lang="en-US" dirty="0"/>
+              <a:t>Socioeconomic status?</a:t>
+            </a:r>
+          </a:p>
+          <a:p>
+            <a:endParaRPr lang="en-US" dirty="0"/>
+          </a:p>
+        </p:txBody>
+      </p:sp>
+    </p:spTree>
+    <p:extLst>
+      <p:ext uri="{BB962C8B-B14F-4D97-AF65-F5344CB8AC3E}">
+        <p14:creationId xmlns:p14="http://schemas.microsoft.com/office/powerpoint/2010/main" val="1509891306"/>
+      </p:ext>
+    </p:extLst>
+  </p:cSld>
+  <p:clrMapOvr>
+    <a:masterClrMapping/>
+  </p:clrMapOvr>
+</p:sld>
+</file>
+
+<file path=ppt/slides/slide6.xml><?xml version="1.0" encoding="utf-8"?>
+<p:sld xmlns:a="http://schemas.openxmlformats.org/drawingml/2006/main" xmlns:r="http://schemas.openxmlformats.org/officeDocument/2006/relationships" xmlns:p="http://schemas.openxmlformats.org/presentationml/2006/main">
+  <p:cSld>
+    <p:spTree>
+      <p:nvGrpSpPr>
+        <p:cNvPr id="1" name=""/>
+        <p:cNvGrpSpPr/>
+        <p:nvPr/>
+      </p:nvGrpSpPr>
+      <p:grpSpPr>
+        <a:xfrm>
+          <a:off x="0" y="0"/>
+          <a:ext cx="0" cy="0"/>
+          <a:chOff x="0" y="0"/>
+          <a:chExt cx="0" cy="0"/>
+        </a:xfrm>
+      </p:grpSpPr>
+      <p:sp>
+        <p:nvSpPr>
+          <p:cNvPr id="2" name="Title 1">
+            <a:extLst>
+              <a:ext uri="{FF2B5EF4-FFF2-40B4-BE49-F238E27FC236}">
+                <a16:creationId xmlns:a16="http://schemas.microsoft.com/office/drawing/2014/main" id="{F5234276-E1AB-4571-BD44-4D63E3DB60AC}"/>
+              </a:ext>
+            </a:extLst>
+          </p:cNvPr>
+          <p:cNvSpPr>
+            <a:spLocks noGrp="1"/>
+          </p:cNvSpPr>
+          <p:nvPr>
+            <p:ph type="title"/>
+          </p:nvPr>
+        </p:nvSpPr>
+        <p:spPr/>
+        <p:txBody>
+          <a:bodyPr/>
+          <a:lstStyle/>
+          <a:p>
+            <a:r>
+              <a:rPr lang="en-US" dirty="0" smtClean="0"/>
+              <a:t>Floor value</a:t>
+            </a:r>
+            <a:endParaRPr lang="en-US" dirty="0"/>
+          </a:p>
+        </p:txBody>
+      </p:sp>
+      <p:sp>
+        <p:nvSpPr>
+          <p:cNvPr id="3" name="Content Placeholder 2">
+            <a:extLst>
+              <a:ext uri="{FF2B5EF4-FFF2-40B4-BE49-F238E27FC236}">
+                <a16:creationId xmlns:a16="http://schemas.microsoft.com/office/drawing/2014/main" id="{47FDA25E-6B10-43A6-A9B6-49DA24EA9AF5}"/>
+              </a:ext>
+            </a:extLst>
+          </p:cNvPr>
+          <p:cNvSpPr>
+            <a:spLocks noGrp="1"/>
+          </p:cNvSpPr>
+          <p:nvPr>
+            <p:ph idx="1"/>
+          </p:nvPr>
+        </p:nvSpPr>
+        <p:spPr/>
+        <p:txBody>
+          <a:bodyPr/>
+          <a:lstStyle/>
+          <a:p>
+            <a:r>
+              <a:rPr lang="en-US" dirty="0" smtClean="0"/>
+              <a:t>Cities have different floor values:</a:t>
+            </a:r>
+          </a:p>
+          <a:p>
+            <a:pPr lvl="1"/>
+            <a:r>
+              <a:rPr lang="en-US" dirty="0" smtClean="0"/>
+              <a:t>University of California Berkeley, The Ride Ann Arbor, and TCAT Ithaca: 90%+</a:t>
+            </a:r>
+          </a:p>
+          <a:p>
+            <a:pPr lvl="1"/>
+            <a:r>
+              <a:rPr lang="en-US" dirty="0"/>
+              <a:t>Seattle and Bay area: 80</a:t>
+            </a:r>
+            <a:r>
+              <a:rPr lang="en-US" dirty="0" smtClean="0"/>
+              <a:t>%</a:t>
+            </a:r>
+            <a:endParaRPr lang="en-US" dirty="0"/>
+          </a:p>
+          <a:p>
+            <a:pPr lvl="1"/>
+            <a:r>
+              <a:rPr lang="en-US" dirty="0"/>
+              <a:t>New York City: 70% </a:t>
+            </a:r>
+          </a:p>
+          <a:p>
+            <a:pPr lvl="1"/>
+            <a:r>
+              <a:rPr lang="en-US" dirty="0">
+                <a:solidFill>
+                  <a:srgbClr val="FF0000"/>
+                </a:solidFill>
+              </a:rPr>
+              <a:t>Ohio (Columbus, Cincinnati, Cleveland): 50% - 60</a:t>
+            </a:r>
+            <a:r>
+              <a:rPr lang="en-US" dirty="0" smtClean="0">
+                <a:solidFill>
+                  <a:srgbClr val="FF0000"/>
+                </a:solidFill>
+              </a:rPr>
+              <a:t>%</a:t>
+            </a:r>
+            <a:endParaRPr lang="en-US" dirty="0">
+              <a:solidFill>
+                <a:srgbClr val="FF0000"/>
+              </a:solidFill>
+            </a:endParaRPr>
+          </a:p>
+          <a:p>
+            <a:pPr lvl="1"/>
+            <a:r>
+              <a:rPr lang="en-US" dirty="0"/>
+              <a:t>Florida (Tampa, Miami, and Orlando): 40% - 50%</a:t>
+            </a:r>
+          </a:p>
+          <a:p>
+            <a:pPr lvl="1"/>
+            <a:endParaRPr lang="en-US" dirty="0" smtClean="0"/>
+          </a:p>
+          <a:p>
+            <a:endParaRPr lang="en-US" dirty="0"/>
+          </a:p>
+        </p:txBody>
+      </p:sp>
+    </p:spTree>
+    <p:extLst>
+      <p:ext uri="{BB962C8B-B14F-4D97-AF65-F5344CB8AC3E}">
+        <p14:creationId xmlns:p14="http://schemas.microsoft.com/office/powerpoint/2010/main" val="3214588791"/>
+      </p:ext>
+    </p:extLst>
+  </p:cSld>
+  <p:clrMapOvr>
+    <a:masterClrMapping/>
+  </p:clrMapOvr>
+</p:sld>
+</file>
+
+<file path=ppt/slides/slide7.xml><?xml version="1.0" encoding="utf-8"?>
 <p:sld xmlns:a="http://schemas.openxmlformats.org/drawingml/2006/main" xmlns:r="http://schemas.openxmlformats.org/officeDocument/2006/relationships" xmlns:p="http://schemas.openxmlformats.org/presentationml/2006/main">
   <p:cSld>
     <p:spTree>
@@ -4464,8 +5426,13 @@
                   <a:schemeClr val="bg1"/>
                 </a:solidFill>
               </a:rPr>
-              <a:t>Transit dependence? </a:t>
-            </a:r>
+              <a:t>Demography? </a:t>
+            </a:r>
+            <a:endParaRPr lang="en-US" dirty="0" smtClean="0">
+              <a:solidFill>
+                <a:schemeClr val="bg1"/>
+              </a:solidFill>
+            </a:endParaRPr>
           </a:p>
           <a:p>
             <a:pPr marL="285750" indent="-285750">
@@ -4576,459 +5543,6 @@
 </p:sld>
 </file>
 
-<file path=ppt/slides/slide5.xml><?xml version="1.0" encoding="utf-8"?>
-<p:sld xmlns:a="http://schemas.openxmlformats.org/drawingml/2006/main" xmlns:r="http://schemas.openxmlformats.org/officeDocument/2006/relationships" xmlns:p="http://schemas.openxmlformats.org/presentationml/2006/main">
-  <p:cSld>
-    <p:spTree>
-      <p:nvGrpSpPr>
-        <p:cNvPr id="1" name=""/>
-        <p:cNvGrpSpPr/>
-        <p:nvPr/>
-      </p:nvGrpSpPr>
-      <p:grpSpPr>
-        <a:xfrm>
-          <a:off x="0" y="0"/>
-          <a:ext cx="0" cy="0"/>
-          <a:chOff x="0" y="0"/>
-          <a:chExt cx="0" cy="0"/>
-        </a:xfrm>
-      </p:grpSpPr>
-      <p:sp>
-        <p:nvSpPr>
-          <p:cNvPr id="2" name="Title 1">
-            <a:extLst>
-              <a:ext uri="{FF2B5EF4-FFF2-40B4-BE49-F238E27FC236}">
-                <a16:creationId xmlns:a16="http://schemas.microsoft.com/office/drawing/2014/main" id="{F5234276-E1AB-4571-BD44-4D63E3DB60AC}"/>
-              </a:ext>
-            </a:extLst>
-          </p:cNvPr>
-          <p:cNvSpPr>
-            <a:spLocks noGrp="1"/>
-          </p:cNvSpPr>
-          <p:nvPr>
-            <p:ph type="title"/>
-          </p:nvPr>
-        </p:nvSpPr>
-        <p:spPr/>
-        <p:txBody>
-          <a:bodyPr/>
-          <a:lstStyle/>
-          <a:p>
-            <a:r>
-              <a:rPr lang="en-US" dirty="0" smtClean="0"/>
-              <a:t>Floor</a:t>
-            </a:r>
-            <a:endParaRPr lang="en-US" dirty="0"/>
-          </a:p>
-        </p:txBody>
-      </p:sp>
-      <p:sp>
-        <p:nvSpPr>
-          <p:cNvPr id="3" name="Content Placeholder 2">
-            <a:extLst>
-              <a:ext uri="{FF2B5EF4-FFF2-40B4-BE49-F238E27FC236}">
-                <a16:creationId xmlns:a16="http://schemas.microsoft.com/office/drawing/2014/main" id="{47FDA25E-6B10-43A6-A9B6-49DA24EA9AF5}"/>
-              </a:ext>
-            </a:extLst>
-          </p:cNvPr>
-          <p:cNvSpPr>
-            <a:spLocks noGrp="1"/>
-          </p:cNvSpPr>
-          <p:nvPr>
-            <p:ph idx="1"/>
-          </p:nvPr>
-        </p:nvSpPr>
-        <p:spPr/>
-        <p:txBody>
-          <a:bodyPr/>
-          <a:lstStyle/>
-          <a:p>
-            <a:r>
-              <a:rPr lang="en-US" dirty="0" smtClean="0"/>
-              <a:t>Cities have different floor </a:t>
-            </a:r>
-            <a:r>
-              <a:rPr lang="en-US" dirty="0" smtClean="0"/>
-              <a:t>values:</a:t>
-            </a:r>
-          </a:p>
-          <a:p>
-            <a:pPr lvl="1"/>
-            <a:r>
-              <a:rPr lang="en-US" dirty="0" smtClean="0"/>
-              <a:t>University of California Berkeley, The Ride Ann Arbor, and TCAT Ithaca: 90%+</a:t>
-            </a:r>
-          </a:p>
-          <a:p>
-            <a:pPr lvl="1"/>
-            <a:r>
-              <a:rPr lang="en-US" dirty="0"/>
-              <a:t>Seattle and Bay area: 80</a:t>
-            </a:r>
-            <a:r>
-              <a:rPr lang="en-US" dirty="0" smtClean="0"/>
-              <a:t>%</a:t>
-            </a:r>
-            <a:endParaRPr lang="en-US" dirty="0"/>
-          </a:p>
-          <a:p>
-            <a:pPr lvl="1"/>
-            <a:r>
-              <a:rPr lang="en-US" dirty="0"/>
-              <a:t>New York City: 70% </a:t>
-            </a:r>
-          </a:p>
-          <a:p>
-            <a:pPr lvl="1"/>
-            <a:r>
-              <a:rPr lang="en-US" dirty="0"/>
-              <a:t>Ohio (Columbus, Cincinnati, Cleveland): 50% - 60</a:t>
-            </a:r>
-            <a:r>
-              <a:rPr lang="en-US" dirty="0" smtClean="0"/>
-              <a:t>%</a:t>
-            </a:r>
-            <a:endParaRPr lang="en-US" dirty="0"/>
-          </a:p>
-          <a:p>
-            <a:pPr lvl="1"/>
-            <a:r>
-              <a:rPr lang="en-US" dirty="0"/>
-              <a:t>Florida (Tampa, Miami, and Orlando): 40% - 50%</a:t>
-            </a:r>
-          </a:p>
-          <a:p>
-            <a:pPr lvl="1"/>
-            <a:endParaRPr lang="en-US" dirty="0" smtClean="0"/>
-          </a:p>
-          <a:p>
-            <a:endParaRPr lang="en-US" dirty="0"/>
-          </a:p>
-        </p:txBody>
-      </p:sp>
-    </p:spTree>
-    <p:extLst>
-      <p:ext uri="{BB962C8B-B14F-4D97-AF65-F5344CB8AC3E}">
-        <p14:creationId xmlns:p14="http://schemas.microsoft.com/office/powerpoint/2010/main" val="3214588791"/>
-      </p:ext>
-    </p:extLst>
-  </p:cSld>
-  <p:clrMapOvr>
-    <a:masterClrMapping/>
-  </p:clrMapOvr>
-</p:sld>
-</file>
-
-<file path=ppt/slides/slide6.xml><?xml version="1.0" encoding="utf-8"?>
-<p:sld xmlns:a="http://schemas.openxmlformats.org/drawingml/2006/main" xmlns:r="http://schemas.openxmlformats.org/officeDocument/2006/relationships" xmlns:p="http://schemas.openxmlformats.org/presentationml/2006/main">
-  <p:cSld>
-    <p:spTree>
-      <p:nvGrpSpPr>
-        <p:cNvPr id="1" name=""/>
-        <p:cNvGrpSpPr/>
-        <p:nvPr/>
-      </p:nvGrpSpPr>
-      <p:grpSpPr>
-        <a:xfrm>
-          <a:off x="0" y="0"/>
-          <a:ext cx="0" cy="0"/>
-          <a:chOff x="0" y="0"/>
-          <a:chExt cx="0" cy="0"/>
-        </a:xfrm>
-      </p:grpSpPr>
-      <p:sp>
-        <p:nvSpPr>
-          <p:cNvPr id="2" name="Title 1">
-            <a:extLst>
-              <a:ext uri="{FF2B5EF4-FFF2-40B4-BE49-F238E27FC236}">
-                <a16:creationId xmlns:a16="http://schemas.microsoft.com/office/drawing/2014/main" id="{FC7FBF6C-3308-4004-86D2-FDCA1AC04907}"/>
-              </a:ext>
-            </a:extLst>
-          </p:cNvPr>
-          <p:cNvSpPr>
-            <a:spLocks noGrp="1"/>
-          </p:cNvSpPr>
-          <p:nvPr>
-            <p:ph type="title"/>
-          </p:nvPr>
-        </p:nvSpPr>
-        <p:spPr/>
-        <p:txBody>
-          <a:bodyPr/>
-          <a:lstStyle/>
-          <a:p>
-            <a:r>
-              <a:rPr lang="en-US" dirty="0" smtClean="0"/>
-              <a:t>Response interval</a:t>
-            </a:r>
-            <a:endParaRPr lang="en-US" dirty="0"/>
-          </a:p>
-        </p:txBody>
-      </p:sp>
-      <p:sp>
-        <p:nvSpPr>
-          <p:cNvPr id="3" name="Content Placeholder 2">
-            <a:extLst>
-              <a:ext uri="{FF2B5EF4-FFF2-40B4-BE49-F238E27FC236}">
-                <a16:creationId xmlns:a16="http://schemas.microsoft.com/office/drawing/2014/main" id="{51A65D60-A859-4F6F-9FC4-7C0E85427904}"/>
-              </a:ext>
-            </a:extLst>
-          </p:cNvPr>
-          <p:cNvSpPr>
-            <a:spLocks noGrp="1"/>
-          </p:cNvSpPr>
-          <p:nvPr>
-            <p:ph idx="1"/>
-          </p:nvPr>
-        </p:nvSpPr>
-        <p:spPr/>
-        <p:txBody>
-          <a:bodyPr>
-            <a:normAutofit/>
-          </a:bodyPr>
-          <a:lstStyle/>
-          <a:p>
-            <a:r>
-              <a:rPr lang="en-US" dirty="0"/>
-              <a:t>T</a:t>
-            </a:r>
-            <a:r>
-              <a:rPr lang="en-US" dirty="0" smtClean="0"/>
-              <a:t>he time lag between covid-19 case increase and transit demand </a:t>
-            </a:r>
-            <a:r>
-              <a:rPr lang="en-US" dirty="0"/>
-              <a:t>decrease</a:t>
-            </a:r>
-          </a:p>
-          <a:p>
-            <a:endParaRPr lang="en-US" dirty="0" smtClean="0"/>
-          </a:p>
-          <a:p>
-            <a:r>
-              <a:rPr lang="en-US" dirty="0" smtClean="0"/>
-              <a:t>Demand </a:t>
-            </a:r>
-            <a:r>
-              <a:rPr lang="en-US" dirty="0"/>
-              <a:t>decrease </a:t>
-            </a:r>
-            <a:r>
-              <a:rPr lang="en-US" dirty="0" smtClean="0"/>
-              <a:t>typically earlier than case increase in a community</a:t>
-            </a:r>
-          </a:p>
-          <a:p>
-            <a:pPr lvl="1"/>
-            <a:r>
-              <a:rPr lang="en-US" sz="2800" dirty="0" smtClean="0"/>
-              <a:t>But not always!</a:t>
-            </a:r>
-          </a:p>
-          <a:p>
-            <a:endParaRPr lang="en-US" dirty="0" smtClean="0"/>
-          </a:p>
-          <a:p>
-            <a:r>
-              <a:rPr lang="en-US" dirty="0" smtClean="0"/>
-              <a:t>Objective: when did people start to avoid transit trips relative to the local community spread?  Are there variations across cities?</a:t>
-            </a:r>
-          </a:p>
-          <a:p>
-            <a:endParaRPr lang="en-US" dirty="0"/>
-          </a:p>
-        </p:txBody>
-      </p:sp>
-    </p:spTree>
-    <p:extLst>
-      <p:ext uri="{BB962C8B-B14F-4D97-AF65-F5344CB8AC3E}">
-        <p14:creationId xmlns:p14="http://schemas.microsoft.com/office/powerpoint/2010/main" val="603326259"/>
-      </p:ext>
-    </p:extLst>
-  </p:cSld>
-  <p:clrMapOvr>
-    <a:masterClrMapping/>
-  </p:clrMapOvr>
-</p:sld>
-</file>
-
-<file path=ppt/slides/slide7.xml><?xml version="1.0" encoding="utf-8"?>
-<p:sld xmlns:a="http://schemas.openxmlformats.org/drawingml/2006/main" xmlns:r="http://schemas.openxmlformats.org/officeDocument/2006/relationships" xmlns:p="http://schemas.openxmlformats.org/presentationml/2006/main">
-  <p:cSld>
-    <p:spTree>
-      <p:nvGrpSpPr>
-        <p:cNvPr id="1" name=""/>
-        <p:cNvGrpSpPr/>
-        <p:nvPr/>
-      </p:nvGrpSpPr>
-      <p:grpSpPr>
-        <a:xfrm>
-          <a:off x="0" y="0"/>
-          <a:ext cx="0" cy="0"/>
-          <a:chOff x="0" y="0"/>
-          <a:chExt cx="0" cy="0"/>
-        </a:xfrm>
-      </p:grpSpPr>
-      <p:sp>
-        <p:nvSpPr>
-          <p:cNvPr id="2" name="Title 1"/>
-          <p:cNvSpPr>
-            <a:spLocks noGrp="1"/>
-          </p:cNvSpPr>
-          <p:nvPr>
-            <p:ph type="title"/>
-          </p:nvPr>
-        </p:nvSpPr>
-        <p:spPr/>
-        <p:txBody>
-          <a:bodyPr/>
-          <a:lstStyle/>
-          <a:p>
-            <a:endParaRPr lang="en-US"/>
-          </a:p>
-        </p:txBody>
-      </p:sp>
-      <p:sp>
-        <p:nvSpPr>
-          <p:cNvPr id="3" name="Content Placeholder 2"/>
-          <p:cNvSpPr>
-            <a:spLocks noGrp="1"/>
-          </p:cNvSpPr>
-          <p:nvPr>
-            <p:ph idx="1"/>
-          </p:nvPr>
-        </p:nvSpPr>
-        <p:spPr/>
-        <p:txBody>
-          <a:bodyPr/>
-          <a:lstStyle/>
-          <a:p>
-            <a:endParaRPr lang="en-US" dirty="0"/>
-          </a:p>
-        </p:txBody>
-      </p:sp>
-      <p:pic>
-        <p:nvPicPr>
-          <p:cNvPr id="1026" name="Picture 2" descr="response_interval"/>
-          <p:cNvPicPr>
-            <a:picLocks noChangeAspect="1" noChangeArrowheads="1"/>
-          </p:cNvPicPr>
-          <p:nvPr/>
-        </p:nvPicPr>
-        <p:blipFill rotWithShape="1">
-          <a:blip r:embed="rId2">
-            <a:extLst>
-              <a:ext uri="{28A0092B-C50C-407E-A947-70E740481C1C}">
-                <a14:useLocalDpi xmlns:a14="http://schemas.microsoft.com/office/drawing/2010/main" val="0"/>
-              </a:ext>
-            </a:extLst>
-          </a:blip>
-          <a:srcRect r="50219" b="66675"/>
-          <a:stretch/>
-        </p:blipFill>
-        <p:spPr bwMode="auto">
-          <a:xfrm>
-            <a:off x="113749" y="0"/>
-            <a:ext cx="11964502" cy="6963507"/>
-          </a:xfrm>
-          <a:prstGeom prst="rect">
-            <a:avLst/>
-          </a:prstGeom>
-          <a:noFill/>
-          <a:ln>
-            <a:noFill/>
-          </a:ln>
-          <a:extLst>
-            <a:ext uri="{909E8E84-426E-40DD-AFC4-6F175D3DCCD1}">
-              <a14:hiddenFill xmlns:a14="http://schemas.microsoft.com/office/drawing/2010/main">
-                <a:solidFill>
-                  <a:srgbClr val="FFFFFF"/>
-                </a:solidFill>
-              </a14:hiddenFill>
-            </a:ext>
-            <a:ext uri="{91240B29-F687-4F45-9708-019B960494DF}">
-              <a14:hiddenLine xmlns:a14="http://schemas.microsoft.com/office/drawing/2010/main" w="9525">
-                <a:solidFill>
-                  <a:srgbClr val="000000"/>
-                </a:solidFill>
-                <a:miter lim="800000"/>
-                <a:headEnd/>
-                <a:tailEnd/>
-              </a14:hiddenLine>
-            </a:ext>
-          </a:extLst>
-        </p:spPr>
-      </p:pic>
-      <p:sp>
-        <p:nvSpPr>
-          <p:cNvPr id="6" name="TextBox 5"/>
-          <p:cNvSpPr txBox="1"/>
-          <p:nvPr/>
-        </p:nvSpPr>
-        <p:spPr>
-          <a:xfrm>
-            <a:off x="2777684" y="902295"/>
-            <a:ext cx="3015762" cy="923330"/>
-          </a:xfrm>
-          <a:prstGeom prst="rect">
-            <a:avLst/>
-          </a:prstGeom>
-          <a:noFill/>
-        </p:spPr>
-        <p:txBody>
-          <a:bodyPr wrap="square" rtlCol="0">
-            <a:spAutoFit/>
-          </a:bodyPr>
-          <a:lstStyle/>
-          <a:p>
-            <a:r>
-              <a:rPr lang="en-US" dirty="0" smtClean="0">
-                <a:solidFill>
-                  <a:schemeClr val="accent1">
-                    <a:lumMod val="60000"/>
-                    <a:lumOff val="40000"/>
-                  </a:schemeClr>
-                </a:solidFill>
-              </a:rPr>
-              <a:t>Blue: responded early</a:t>
-            </a:r>
-          </a:p>
-          <a:p>
-            <a:pPr lvl="0"/>
-            <a:r>
-              <a:rPr lang="en-US" dirty="0">
-                <a:solidFill>
-                  <a:srgbClr val="FF0000"/>
-                </a:solidFill>
-              </a:rPr>
-              <a:t>Red: responded late</a:t>
-            </a:r>
-          </a:p>
-          <a:p>
-            <a:endParaRPr lang="en-US" dirty="0">
-              <a:solidFill>
-                <a:schemeClr val="accent1">
-                  <a:lumMod val="60000"/>
-                  <a:lumOff val="40000"/>
-                </a:schemeClr>
-              </a:solidFill>
-            </a:endParaRPr>
-          </a:p>
-        </p:txBody>
-      </p:sp>
-    </p:spTree>
-    <p:extLst>
-      <p:ext uri="{BB962C8B-B14F-4D97-AF65-F5344CB8AC3E}">
-        <p14:creationId xmlns:p14="http://schemas.microsoft.com/office/powerpoint/2010/main" val="2510810732"/>
-      </p:ext>
-    </p:extLst>
-  </p:cSld>
-  <p:clrMapOvr>
-    <a:masterClrMapping/>
-  </p:clrMapOvr>
-</p:sld>
-</file>
-
 <file path=ppt/slides/slide8.xml><?xml version="1.0" encoding="utf-8"?>
 <p:sld xmlns:a="http://schemas.openxmlformats.org/drawingml/2006/main" xmlns:r="http://schemas.openxmlformats.org/officeDocument/2006/relationships" xmlns:p="http://schemas.openxmlformats.org/presentationml/2006/main">
   <p:cSld>
@@ -5046,47 +5560,66 @@
           <a:chExt cx="0" cy="0"/>
         </a:xfrm>
       </p:grpSpPr>
-      <p:pic>
-        <p:nvPicPr>
-          <p:cNvPr id="4" name="Picture 3"/>
-          <p:cNvPicPr>
-            <a:picLocks noChangeAspect="1"/>
-          </p:cNvPicPr>
-          <p:nvPr/>
-        </p:nvPicPr>
-        <p:blipFill>
-          <a:blip r:embed="rId2"/>
-          <a:stretch>
-            <a:fillRect/>
-          </a:stretch>
-        </p:blipFill>
-        <p:spPr>
-          <a:xfrm>
-            <a:off x="1666875" y="-47625"/>
-            <a:ext cx="8858250" cy="6953250"/>
-          </a:xfrm>
-          <a:prstGeom prst="rect">
-            <a:avLst/>
-          </a:prstGeom>
-        </p:spPr>
-      </p:pic>
+      <p:sp>
+        <p:nvSpPr>
+          <p:cNvPr id="2" name="Title 1"/>
+          <p:cNvSpPr>
+            <a:spLocks noGrp="1"/>
+          </p:cNvSpPr>
+          <p:nvPr>
+            <p:ph type="title"/>
+          </p:nvPr>
+        </p:nvSpPr>
+        <p:spPr/>
+        <p:txBody>
+          <a:bodyPr/>
+          <a:lstStyle/>
+          <a:p>
+            <a:r>
+              <a:rPr lang="en-US" altLang="zh-CN" dirty="0"/>
+              <a:t>Who are still using transit </a:t>
+            </a:r>
+            <a:r>
+              <a:rPr lang="en-US" altLang="zh-CN" dirty="0" smtClean="0"/>
+              <a:t>during the pandemic</a:t>
+            </a:r>
+            <a:endParaRPr lang="en-US" dirty="0"/>
+          </a:p>
+        </p:txBody>
+      </p:sp>
+      <p:sp>
+        <p:nvSpPr>
+          <p:cNvPr id="3" name="Text Placeholder 2"/>
+          <p:cNvSpPr>
+            <a:spLocks noGrp="1"/>
+          </p:cNvSpPr>
+          <p:nvPr>
+            <p:ph type="body" idx="1"/>
+          </p:nvPr>
+        </p:nvSpPr>
+        <p:spPr/>
+        <p:txBody>
+          <a:bodyPr/>
+          <a:lstStyle/>
+          <a:p>
+            <a:r>
+              <a:rPr lang="en-US" dirty="0" smtClean="0"/>
+              <a:t>Some conclusions from our research and the survey by Transit app</a:t>
+            </a:r>
+            <a:endParaRPr lang="en-US" dirty="0"/>
+          </a:p>
+        </p:txBody>
+      </p:sp>
     </p:spTree>
     <p:extLst>
       <p:ext uri="{BB962C8B-B14F-4D97-AF65-F5344CB8AC3E}">
-        <p14:creationId xmlns:p14="http://schemas.microsoft.com/office/powerpoint/2010/main" val="2153003257"/>
+        <p14:creationId xmlns:p14="http://schemas.microsoft.com/office/powerpoint/2010/main" val="2230177466"/>
       </p:ext>
     </p:extLst>
   </p:cSld>
   <p:clrMapOvr>
     <a:masterClrMapping/>
   </p:clrMapOvr>
-  <p:timing>
-    <p:tnLst>
-      <p:par>
-        <p:cTn id="1" dur="indefinite" restart="never" nodeType="tmRoot"/>
-      </p:par>
-    </p:tnLst>
-  </p:timing>
 </p:sld>
 </file>
 
@@ -5114,32 +5647,78 @@
             <a:spLocks noGrp="1"/>
           </p:cNvSpPr>
           <p:nvPr>
-            <p:ph type="ctrTitle"/>
-          </p:nvPr>
-        </p:nvSpPr>
-        <p:spPr/>
-        <p:txBody>
-          <a:bodyPr>
-            <a:normAutofit/>
-          </a:bodyPr>
-          <a:lstStyle/>
-          <a:p>
-            <a:r>
-              <a:rPr lang="en-US" sz="5400" dirty="0"/>
-              <a:t>Q</a:t>
-            </a:r>
-            <a:r>
-              <a:rPr lang="en-US" sz="5400" dirty="0" smtClean="0"/>
-              <a:t>uestions for Transit</a:t>
-            </a:r>
-            <a:endParaRPr lang="en-US" sz="5400" dirty="0"/>
+            <p:ph type="title"/>
+          </p:nvPr>
+        </p:nvSpPr>
+        <p:spPr/>
+        <p:txBody>
+          <a:bodyPr/>
+          <a:lstStyle/>
+          <a:p>
+            <a:r>
+              <a:rPr lang="en-US" dirty="0" smtClean="0"/>
+              <a:t>Survey</a:t>
+            </a:r>
+            <a:endParaRPr lang="en-US" dirty="0"/>
+          </a:p>
+        </p:txBody>
+      </p:sp>
+      <p:sp>
+        <p:nvSpPr>
+          <p:cNvPr id="3" name="Content Placeholder 2"/>
+          <p:cNvSpPr>
+            <a:spLocks noGrp="1"/>
+          </p:cNvSpPr>
+          <p:nvPr>
+            <p:ph idx="1"/>
+          </p:nvPr>
+        </p:nvSpPr>
+        <p:spPr/>
+        <p:txBody>
+          <a:bodyPr/>
+          <a:lstStyle/>
+          <a:p>
+            <a:r>
+              <a:rPr lang="en-US" dirty="0" smtClean="0"/>
+              <a:t>Transit app conduced a user survey (n= 25000, n = 15000 in US) about who are still using the transit during the pandemic.</a:t>
+            </a:r>
+          </a:p>
+          <a:p>
+            <a:r>
+              <a:rPr lang="en-US" dirty="0" smtClean="0"/>
+              <a:t>Survey different aspects of the “</a:t>
+            </a:r>
+            <a:r>
+              <a:rPr lang="en-US" dirty="0" smtClean="0">
+                <a:solidFill>
+                  <a:srgbClr val="FF0000"/>
+                </a:solidFill>
+              </a:rPr>
+              <a:t>essential transit users</a:t>
+            </a:r>
+            <a:r>
+              <a:rPr lang="en-US" dirty="0" smtClean="0"/>
+              <a:t>” during the pandemic, including mobility, social-economic, and demographic information.</a:t>
+            </a:r>
+          </a:p>
+          <a:p>
+            <a:endParaRPr lang="en-US" dirty="0"/>
+          </a:p>
+          <a:p>
+            <a:r>
+              <a:rPr lang="en-US" dirty="0"/>
+              <a:t>Different data source, same conclusions.</a:t>
+            </a:r>
+          </a:p>
+          <a:p>
+            <a:endParaRPr lang="en-US" dirty="0"/>
           </a:p>
         </p:txBody>
       </p:sp>
     </p:spTree>
     <p:extLst>
       <p:ext uri="{BB962C8B-B14F-4D97-AF65-F5344CB8AC3E}">
-        <p14:creationId xmlns:p14="http://schemas.microsoft.com/office/powerpoint/2010/main" val="220074879"/>
+        <p14:creationId xmlns:p14="http://schemas.microsoft.com/office/powerpoint/2010/main" val="2674071149"/>
       </p:ext>
     </p:extLst>
   </p:cSld>

</xml_diff>

<commit_message>
Update transit app ppt
</commit_message>
<xml_diff>
--- a/doc/pre_results.pptx
+++ b/doc/pre_results.pptx
@@ -3316,7 +3316,6 @@
               <a:rPr lang="en-US" sz="2000" dirty="0"/>
               <a:t>Science.</a:t>
             </a:r>
-            <a:endParaRPr lang="en-US" sz="2000" dirty="0"/>
           </a:p>
         </p:txBody>
       </p:sp>
@@ -4288,7 +4287,31 @@
                   <a:srgbClr val="FF0000"/>
                 </a:solidFill>
               </a:rPr>
-              <a:t>Indicates how many people opened the Transit app in a single day;</a:t>
+              <a:t>Indicates how many people opened the Transit app in </a:t>
+            </a:r>
+            <a:r>
+              <a:rPr lang="en-US" altLang="zh-CN" dirty="0" smtClean="0">
+                <a:solidFill>
+                  <a:srgbClr val="FF0000"/>
+                </a:solidFill>
+              </a:rPr>
+              <a:t>each</a:t>
+            </a:r>
+            <a:r>
+              <a:rPr lang="en-US" dirty="0" smtClean="0">
+                <a:solidFill>
+                  <a:srgbClr val="FF0000"/>
+                </a:solidFill>
+              </a:rPr>
+              <a:t> </a:t>
+            </a:r>
+            <a:r>
+              <a:rPr lang="en-US" dirty="0" smtClean="0">
+                <a:solidFill>
+                  <a:srgbClr val="FF0000"/>
+                </a:solidFill>
+              </a:rPr>
+              <a:t>single day;</a:t>
             </a:r>
           </a:p>
           <a:p>
@@ -5428,11 +5451,6 @@
               </a:rPr>
               <a:t>Demography? </a:t>
             </a:r>
-            <a:endParaRPr lang="en-US" dirty="0" smtClean="0">
-              <a:solidFill>
-                <a:schemeClr val="bg1"/>
-              </a:solidFill>
-            </a:endParaRPr>
           </a:p>
           <a:p>
             <a:pPr marL="285750" indent="-285750">

</xml_diff>

<commit_message>
Update transit app ppt final
</commit_message>
<xml_diff>
--- a/doc/pre_results.pptx
+++ b/doc/pre_results.pptx
@@ -18,11 +18,13 @@
     <p:sldId id="281" r:id="rId12"/>
     <p:sldId id="282" r:id="rId13"/>
     <p:sldId id="287" r:id="rId14"/>
-    <p:sldId id="286" r:id="rId15"/>
-    <p:sldId id="288" r:id="rId16"/>
-    <p:sldId id="284" r:id="rId17"/>
-    <p:sldId id="289" r:id="rId18"/>
-    <p:sldId id="290" r:id="rId19"/>
+    <p:sldId id="291" r:id="rId15"/>
+    <p:sldId id="292" r:id="rId16"/>
+    <p:sldId id="288" r:id="rId17"/>
+    <p:sldId id="293" r:id="rId18"/>
+    <p:sldId id="284" r:id="rId19"/>
+    <p:sldId id="289" r:id="rId20"/>
+    <p:sldId id="290" r:id="rId21"/>
   </p:sldIdLst>
   <p:sldSz cx="12192000" cy="6858000"/>
   <p:notesSz cx="6858000" cy="9144000"/>
@@ -270,7 +272,7 @@
           <a:p>
             <a:fld id="{F24761F3-EBE3-47CA-9C15-B1B8E3A6DAF7}" type="datetimeFigureOut">
               <a:rPr lang="en-US" smtClean="0"/>
-              <a:t>5/4/2020</a:t>
+              <a:t>5/5/2020</a:t>
             </a:fld>
             <a:endParaRPr lang="en-US"/>
           </a:p>
@@ -438,7 +440,7 @@
           <a:p>
             <a:fld id="{F24761F3-EBE3-47CA-9C15-B1B8E3A6DAF7}" type="datetimeFigureOut">
               <a:rPr lang="en-US" smtClean="0"/>
-              <a:t>5/4/2020</a:t>
+              <a:t>5/5/2020</a:t>
             </a:fld>
             <a:endParaRPr lang="en-US"/>
           </a:p>
@@ -616,7 +618,7 @@
           <a:p>
             <a:fld id="{F24761F3-EBE3-47CA-9C15-B1B8E3A6DAF7}" type="datetimeFigureOut">
               <a:rPr lang="en-US" smtClean="0"/>
-              <a:t>5/4/2020</a:t>
+              <a:t>5/5/2020</a:t>
             </a:fld>
             <a:endParaRPr lang="en-US"/>
           </a:p>
@@ -784,7 +786,7 @@
           <a:p>
             <a:fld id="{F24761F3-EBE3-47CA-9C15-B1B8E3A6DAF7}" type="datetimeFigureOut">
               <a:rPr lang="en-US" smtClean="0"/>
-              <a:t>5/4/2020</a:t>
+              <a:t>5/5/2020</a:t>
             </a:fld>
             <a:endParaRPr lang="en-US"/>
           </a:p>
@@ -1029,7 +1031,7 @@
           <a:p>
             <a:fld id="{F24761F3-EBE3-47CA-9C15-B1B8E3A6DAF7}" type="datetimeFigureOut">
               <a:rPr lang="en-US" smtClean="0"/>
-              <a:t>5/4/2020</a:t>
+              <a:t>5/5/2020</a:t>
             </a:fld>
             <a:endParaRPr lang="en-US"/>
           </a:p>
@@ -1258,7 +1260,7 @@
           <a:p>
             <a:fld id="{F24761F3-EBE3-47CA-9C15-B1B8E3A6DAF7}" type="datetimeFigureOut">
               <a:rPr lang="en-US" smtClean="0"/>
-              <a:t>5/4/2020</a:t>
+              <a:t>5/5/2020</a:t>
             </a:fld>
             <a:endParaRPr lang="en-US"/>
           </a:p>
@@ -1622,7 +1624,7 @@
           <a:p>
             <a:fld id="{F24761F3-EBE3-47CA-9C15-B1B8E3A6DAF7}" type="datetimeFigureOut">
               <a:rPr lang="en-US" smtClean="0"/>
-              <a:t>5/4/2020</a:t>
+              <a:t>5/5/2020</a:t>
             </a:fld>
             <a:endParaRPr lang="en-US"/>
           </a:p>
@@ -1739,7 +1741,7 @@
           <a:p>
             <a:fld id="{F24761F3-EBE3-47CA-9C15-B1B8E3A6DAF7}" type="datetimeFigureOut">
               <a:rPr lang="en-US" smtClean="0"/>
-              <a:t>5/4/2020</a:t>
+              <a:t>5/5/2020</a:t>
             </a:fld>
             <a:endParaRPr lang="en-US"/>
           </a:p>
@@ -1834,7 +1836,7 @@
           <a:p>
             <a:fld id="{F24761F3-EBE3-47CA-9C15-B1B8E3A6DAF7}" type="datetimeFigureOut">
               <a:rPr lang="en-US" smtClean="0"/>
-              <a:t>5/4/2020</a:t>
+              <a:t>5/5/2020</a:t>
             </a:fld>
             <a:endParaRPr lang="en-US"/>
           </a:p>
@@ -2109,7 +2111,7 @@
           <a:p>
             <a:fld id="{F24761F3-EBE3-47CA-9C15-B1B8E3A6DAF7}" type="datetimeFigureOut">
               <a:rPr lang="en-US" smtClean="0"/>
-              <a:t>5/4/2020</a:t>
+              <a:t>5/5/2020</a:t>
             </a:fld>
             <a:endParaRPr lang="en-US"/>
           </a:p>
@@ -2361,7 +2363,7 @@
           <a:p>
             <a:fld id="{F24761F3-EBE3-47CA-9C15-B1B8E3A6DAF7}" type="datetimeFigureOut">
               <a:rPr lang="en-US" smtClean="0"/>
-              <a:t>5/4/2020</a:t>
+              <a:t>5/5/2020</a:t>
             </a:fld>
             <a:endParaRPr lang="en-US"/>
           </a:p>
@@ -2572,7 +2574,7 @@
           <a:p>
             <a:fld id="{F24761F3-EBE3-47CA-9C15-B1B8E3A6DAF7}" type="datetimeFigureOut">
               <a:rPr lang="en-US" smtClean="0"/>
-              <a:t>5/4/2020</a:t>
+              <a:t>5/5/2020</a:t>
             </a:fld>
             <a:endParaRPr lang="en-US"/>
           </a:p>
@@ -3788,7 +3790,7 @@
           <a:p>
             <a:r>
               <a:rPr lang="en-US" dirty="0" smtClean="0"/>
-              <a:t>Who is the essential workers again?</a:t>
+              <a:t>A building on fire</a:t>
             </a:r>
             <a:endParaRPr lang="en-US" dirty="0"/>
           </a:p>
@@ -3809,55 +3811,52 @@
           <a:bodyPr/>
           <a:lstStyle/>
           <a:p>
-            <a:endParaRPr lang="en-US"/>
-          </a:p>
-        </p:txBody>
-      </p:sp>
-      <p:pic>
-        <p:nvPicPr>
-          <p:cNvPr id="2050" name="Picture 2" descr="Protests over coronavirus orders started with fringe groups, but ..."/>
-          <p:cNvPicPr>
-            <a:picLocks noChangeAspect="1" noChangeArrowheads="1"/>
-          </p:cNvPicPr>
-          <p:nvPr/>
-        </p:nvPicPr>
-        <p:blipFill>
-          <a:blip r:embed="rId2" cstate="print">
-            <a:extLst>
-              <a:ext uri="{28A0092B-C50C-407E-A947-70E740481C1C}">
-                <a14:useLocalDpi xmlns:a14="http://schemas.microsoft.com/office/drawing/2010/main" val="0"/>
-              </a:ext>
-            </a:extLst>
-          </a:blip>
-          <a:srcRect/>
-          <a:stretch>
-            <a:fillRect/>
-          </a:stretch>
-        </p:blipFill>
-        <p:spPr bwMode="auto">
-          <a:xfrm>
-            <a:off x="3348163" y="2031518"/>
-            <a:ext cx="5495674" cy="3939551"/>
-          </a:xfrm>
-          <a:prstGeom prst="rect">
-            <a:avLst/>
-          </a:prstGeom>
-          <a:noFill/>
-          <a:extLst>
-            <a:ext uri="{909E8E84-426E-40DD-AFC4-6F175D3DCCD1}">
-              <a14:hiddenFill xmlns:a14="http://schemas.microsoft.com/office/drawing/2010/main">
-                <a:solidFill>
-                  <a:srgbClr val="FFFFFF"/>
-                </a:solidFill>
-              </a14:hiddenFill>
-            </a:ext>
-          </a:extLst>
-        </p:spPr>
-      </p:pic>
+            <a:pPr marL="0" indent="0">
+              <a:buNone/>
+            </a:pPr>
+            <a:r>
+              <a:rPr lang="en-US" dirty="0" smtClean="0"/>
+              <a:t>Awareness of the fact that building is on fire:</a:t>
+            </a:r>
+          </a:p>
+          <a:p>
+            <a:pPr marL="0" indent="0">
+              <a:buNone/>
+            </a:pPr>
+            <a:endParaRPr lang="en-US" dirty="0" smtClean="0"/>
+          </a:p>
+          <a:p>
+            <a:r>
+              <a:rPr lang="en-US" dirty="0" smtClean="0"/>
+              <a:t>Is relevant to the fleeing speed of those who can run for their life;</a:t>
+            </a:r>
+          </a:p>
+          <a:p>
+            <a:r>
+              <a:rPr lang="en-US" dirty="0" smtClean="0"/>
+              <a:t>Is not relevant to the amount of people who will run for their life;</a:t>
+            </a:r>
+          </a:p>
+          <a:p>
+            <a:r>
+              <a:rPr lang="en-US" dirty="0" smtClean="0"/>
+              <a:t>Instead, your race, your age, your sex/gender, and your occupation are the factors that are relevant to whether you can run for your life.</a:t>
+            </a:r>
+          </a:p>
+          <a:p>
+            <a:pPr lvl="1"/>
+            <a:endParaRPr lang="en-US" dirty="0"/>
+          </a:p>
+          <a:p>
+            <a:pPr lvl="1"/>
+            <a:endParaRPr lang="en-US" dirty="0"/>
+          </a:p>
+        </p:txBody>
+      </p:sp>
     </p:spTree>
     <p:extLst>
       <p:ext uri="{BB962C8B-B14F-4D97-AF65-F5344CB8AC3E}">
-        <p14:creationId xmlns:p14="http://schemas.microsoft.com/office/powerpoint/2010/main" val="3743289153"/>
+        <p14:creationId xmlns:p14="http://schemas.microsoft.com/office/powerpoint/2010/main" val="3389293229"/>
       </p:ext>
     </p:extLst>
   </p:cSld>
@@ -3900,6 +3899,160 @@
           <a:lstStyle/>
           <a:p>
             <a:r>
+              <a:rPr lang="en-US" dirty="0" smtClean="0"/>
+              <a:t>Who is the essential workers again?</a:t>
+            </a:r>
+            <a:endParaRPr lang="en-US" dirty="0"/>
+          </a:p>
+        </p:txBody>
+      </p:sp>
+      <p:sp>
+        <p:nvSpPr>
+          <p:cNvPr id="3" name="Content Placeholder 2"/>
+          <p:cNvSpPr>
+            <a:spLocks noGrp="1"/>
+          </p:cNvSpPr>
+          <p:nvPr>
+            <p:ph idx="1"/>
+          </p:nvPr>
+        </p:nvSpPr>
+        <p:spPr/>
+        <p:txBody>
+          <a:bodyPr/>
+          <a:lstStyle/>
+          <a:p>
+            <a:endParaRPr lang="en-US"/>
+          </a:p>
+        </p:txBody>
+      </p:sp>
+      <p:pic>
+        <p:nvPicPr>
+          <p:cNvPr id="2050" name="Picture 2" descr="Protests over coronavirus orders started with fringe groups, but ..."/>
+          <p:cNvPicPr>
+            <a:picLocks noChangeAspect="1" noChangeArrowheads="1"/>
+          </p:cNvPicPr>
+          <p:nvPr/>
+        </p:nvPicPr>
+        <p:blipFill>
+          <a:blip r:embed="rId2" cstate="print">
+            <a:extLst>
+              <a:ext uri="{28A0092B-C50C-407E-A947-70E740481C1C}">
+                <a14:useLocalDpi xmlns:a14="http://schemas.microsoft.com/office/drawing/2010/main" val="0"/>
+              </a:ext>
+            </a:extLst>
+          </a:blip>
+          <a:srcRect/>
+          <a:stretch>
+            <a:fillRect/>
+          </a:stretch>
+        </p:blipFill>
+        <p:spPr bwMode="auto">
+          <a:xfrm>
+            <a:off x="341193" y="2031518"/>
+            <a:ext cx="5495674" cy="3939551"/>
+          </a:xfrm>
+          <a:prstGeom prst="rect">
+            <a:avLst/>
+          </a:prstGeom>
+          <a:noFill/>
+          <a:extLst>
+            <a:ext uri="{909E8E84-426E-40DD-AFC4-6F175D3DCCD1}">
+              <a14:hiddenFill xmlns:a14="http://schemas.microsoft.com/office/drawing/2010/main">
+                <a:solidFill>
+                  <a:srgbClr val="FFFFFF"/>
+                </a:solidFill>
+              </a14:hiddenFill>
+            </a:ext>
+          </a:extLst>
+        </p:spPr>
+      </p:pic>
+      <p:pic>
+        <p:nvPicPr>
+          <p:cNvPr id="4" name="Picture 2" descr="Grocery Workers Plea for Virus Safety Measures as Clerks Deal With ..."/>
+          <p:cNvPicPr>
+            <a:picLocks noChangeAspect="1" noChangeArrowheads="1"/>
+          </p:cNvPicPr>
+          <p:nvPr/>
+        </p:nvPicPr>
+        <p:blipFill>
+          <a:blip r:embed="rId3">
+            <a:extLst>
+              <a:ext uri="{28A0092B-C50C-407E-A947-70E740481C1C}">
+                <a14:useLocalDpi xmlns:a14="http://schemas.microsoft.com/office/drawing/2010/main" val="0"/>
+              </a:ext>
+            </a:extLst>
+          </a:blip>
+          <a:srcRect/>
+          <a:stretch>
+            <a:fillRect/>
+          </a:stretch>
+        </p:blipFill>
+        <p:spPr bwMode="auto">
+          <a:xfrm>
+            <a:off x="6096000" y="2416527"/>
+            <a:ext cx="5990136" cy="3368812"/>
+          </a:xfrm>
+          <a:prstGeom prst="rect">
+            <a:avLst/>
+          </a:prstGeom>
+          <a:noFill/>
+          <a:extLst>
+            <a:ext uri="{909E8E84-426E-40DD-AFC4-6F175D3DCCD1}">
+              <a14:hiddenFill xmlns:a14="http://schemas.microsoft.com/office/drawing/2010/main">
+                <a:solidFill>
+                  <a:srgbClr val="FFFFFF"/>
+                </a:solidFill>
+              </a14:hiddenFill>
+            </a:ext>
+          </a:extLst>
+        </p:spPr>
+      </p:pic>
+    </p:spTree>
+    <p:extLst>
+      <p:ext uri="{BB962C8B-B14F-4D97-AF65-F5344CB8AC3E}">
+        <p14:creationId xmlns:p14="http://schemas.microsoft.com/office/powerpoint/2010/main" val="3629954682"/>
+      </p:ext>
+    </p:extLst>
+  </p:cSld>
+  <p:clrMapOvr>
+    <a:masterClrMapping/>
+  </p:clrMapOvr>
+</p:sld>
+</file>
+
+<file path=ppt/slides/slide16.xml><?xml version="1.0" encoding="utf-8"?>
+<p:sld xmlns:a="http://schemas.openxmlformats.org/drawingml/2006/main" xmlns:r="http://schemas.openxmlformats.org/officeDocument/2006/relationships" xmlns:p="http://schemas.openxmlformats.org/presentationml/2006/main">
+  <p:cSld>
+    <p:spTree>
+      <p:nvGrpSpPr>
+        <p:cNvPr id="1" name=""/>
+        <p:cNvGrpSpPr/>
+        <p:nvPr/>
+      </p:nvGrpSpPr>
+      <p:grpSpPr>
+        <a:xfrm>
+          <a:off x="0" y="0"/>
+          <a:ext cx="0" cy="0"/>
+          <a:chOff x="0" y="0"/>
+          <a:chExt cx="0" cy="0"/>
+        </a:xfrm>
+      </p:grpSpPr>
+      <p:sp>
+        <p:nvSpPr>
+          <p:cNvPr id="2" name="Title 1"/>
+          <p:cNvSpPr>
+            <a:spLocks noGrp="1"/>
+          </p:cNvSpPr>
+          <p:nvPr>
+            <p:ph type="title"/>
+          </p:nvPr>
+        </p:nvSpPr>
+        <p:spPr/>
+        <p:txBody>
+          <a:bodyPr/>
+          <a:lstStyle/>
+          <a:p>
+            <a:r>
               <a:rPr lang="en-US" dirty="0"/>
               <a:t>Peaks and commuting</a:t>
             </a:r>
@@ -3938,7 +4091,105 @@
 </p:sld>
 </file>
 
-<file path=ppt/slides/slide16.xml><?xml version="1.0" encoding="utf-8"?>
+<file path=ppt/slides/slide17.xml><?xml version="1.0" encoding="utf-8"?>
+<p:sld xmlns:a="http://schemas.openxmlformats.org/drawingml/2006/main" xmlns:r="http://schemas.openxmlformats.org/officeDocument/2006/relationships" xmlns:p="http://schemas.openxmlformats.org/presentationml/2006/main">
+  <p:cSld>
+    <p:spTree>
+      <p:nvGrpSpPr>
+        <p:cNvPr id="1" name=""/>
+        <p:cNvGrpSpPr/>
+        <p:nvPr/>
+      </p:nvGrpSpPr>
+      <p:grpSpPr>
+        <a:xfrm>
+          <a:off x="0" y="0"/>
+          <a:ext cx="0" cy="0"/>
+          <a:chOff x="0" y="0"/>
+          <a:chExt cx="0" cy="0"/>
+        </a:xfrm>
+      </p:grpSpPr>
+      <p:sp>
+        <p:nvSpPr>
+          <p:cNvPr id="2" name="Title 1"/>
+          <p:cNvSpPr>
+            <a:spLocks noGrp="1"/>
+          </p:cNvSpPr>
+          <p:nvPr>
+            <p:ph type="title"/>
+          </p:nvPr>
+        </p:nvSpPr>
+        <p:spPr/>
+        <p:txBody>
+          <a:bodyPr/>
+          <a:lstStyle/>
+          <a:p>
+            <a:r>
+              <a:rPr lang="en-US" dirty="0" smtClean="0"/>
+              <a:t>Weekdays and weekends are no more</a:t>
+            </a:r>
+            <a:endParaRPr lang="en-US" dirty="0"/>
+          </a:p>
+        </p:txBody>
+      </p:sp>
+      <p:sp>
+        <p:nvSpPr>
+          <p:cNvPr id="3" name="Content Placeholder 2"/>
+          <p:cNvSpPr>
+            <a:spLocks noGrp="1"/>
+          </p:cNvSpPr>
+          <p:nvPr>
+            <p:ph idx="1"/>
+          </p:nvPr>
+        </p:nvSpPr>
+        <p:spPr/>
+        <p:txBody>
+          <a:bodyPr>
+            <a:normAutofit/>
+          </a:bodyPr>
+          <a:lstStyle/>
+          <a:p>
+            <a:pPr lvl="0"/>
+            <a:r>
+              <a:rPr lang="en-US" dirty="0"/>
+              <a:t>The pandemic made difference of the dynamic within a day between weekdays and weekends less obvious.</a:t>
+            </a:r>
+            <a:endParaRPr lang="en-US" sz="2400" dirty="0"/>
+          </a:p>
+          <a:p>
+            <a:pPr lvl="1"/>
+            <a:r>
+              <a:rPr lang="en-US" dirty="0"/>
+              <a:t>Weekends are more like weekdays. In many systems such the MTA system in New York City, the weekends curves show a two-peak patterns when it only had one peak. The cessation of the unessential businesses made the weekends trips become commuting-dominating.</a:t>
+            </a:r>
+            <a:endParaRPr lang="en-US" sz="2000" dirty="0"/>
+          </a:p>
+          <a:p>
+            <a:pPr lvl="1"/>
+            <a:r>
+              <a:rPr lang="en-US" dirty="0"/>
+              <a:t>Weekdays are more like weekends. Disproportional decrease of the morning and afternoon commuting activities in the weekdays made the difference between rush hours and normal hours less obvious.</a:t>
+            </a:r>
+            <a:endParaRPr lang="en-US" sz="2000" dirty="0"/>
+          </a:p>
+          <a:p>
+            <a:endParaRPr lang="en-US" dirty="0"/>
+          </a:p>
+        </p:txBody>
+      </p:sp>
+    </p:spTree>
+    <p:extLst>
+      <p:ext uri="{BB962C8B-B14F-4D97-AF65-F5344CB8AC3E}">
+        <p14:creationId xmlns:p14="http://schemas.microsoft.com/office/powerpoint/2010/main" val="1946574013"/>
+      </p:ext>
+    </p:extLst>
+  </p:cSld>
+  <p:clrMapOvr>
+    <a:masterClrMapping/>
+  </p:clrMapOvr>
+</p:sld>
+</file>
+
+<file path=ppt/slides/slide18.xml><?xml version="1.0" encoding="utf-8"?>
 <p:sld xmlns:a="http://schemas.openxmlformats.org/drawingml/2006/main" xmlns:r="http://schemas.openxmlformats.org/officeDocument/2006/relationships" xmlns:p="http://schemas.openxmlformats.org/presentationml/2006/main">
   <p:cSld>
     <p:spTree>
@@ -4030,7 +4281,7 @@
 </p:sld>
 </file>
 
-<file path=ppt/slides/slide17.xml><?xml version="1.0" encoding="utf-8"?>
+<file path=ppt/slides/slide19.xml><?xml version="1.0" encoding="utf-8"?>
 <p:sld xmlns:a="http://schemas.openxmlformats.org/drawingml/2006/main" xmlns:r="http://schemas.openxmlformats.org/officeDocument/2006/relationships" xmlns:p="http://schemas.openxmlformats.org/presentationml/2006/main">
   <p:cSld>
     <p:spTree>
@@ -4122,7 +4373,142 @@
 </p:sld>
 </file>
 
-<file path=ppt/slides/slide18.xml><?xml version="1.0" encoding="utf-8"?>
+<file path=ppt/slides/slide2.xml><?xml version="1.0" encoding="utf-8"?>
+<p:sld xmlns:a="http://schemas.openxmlformats.org/drawingml/2006/main" xmlns:r="http://schemas.openxmlformats.org/officeDocument/2006/relationships" xmlns:p="http://schemas.openxmlformats.org/presentationml/2006/main">
+  <p:cSld>
+    <p:spTree>
+      <p:nvGrpSpPr>
+        <p:cNvPr id="1" name=""/>
+        <p:cNvGrpSpPr/>
+        <p:nvPr/>
+      </p:nvGrpSpPr>
+      <p:grpSpPr>
+        <a:xfrm>
+          <a:off x="0" y="0"/>
+          <a:ext cx="0" cy="0"/>
+          <a:chOff x="0" y="0"/>
+          <a:chExt cx="0" cy="0"/>
+        </a:xfrm>
+      </p:grpSpPr>
+      <p:sp>
+        <p:nvSpPr>
+          <p:cNvPr id="2" name="Title 1"/>
+          <p:cNvSpPr>
+            <a:spLocks noGrp="1"/>
+          </p:cNvSpPr>
+          <p:nvPr>
+            <p:ph type="title"/>
+          </p:nvPr>
+        </p:nvSpPr>
+        <p:spPr/>
+        <p:txBody>
+          <a:bodyPr/>
+          <a:lstStyle/>
+          <a:p>
+            <a:r>
+              <a:rPr lang="en-US" dirty="0" smtClean="0"/>
+              <a:t>Data – </a:t>
+            </a:r>
+            <a:r>
+              <a:rPr lang="en-US" dirty="0" smtClean="0">
+                <a:solidFill>
+                  <a:srgbClr val="FF0000"/>
+                </a:solidFill>
+              </a:rPr>
+              <a:t>transit demand</a:t>
+            </a:r>
+            <a:endParaRPr lang="en-US" dirty="0">
+              <a:solidFill>
+                <a:srgbClr val="FF0000"/>
+              </a:solidFill>
+            </a:endParaRPr>
+          </a:p>
+        </p:txBody>
+      </p:sp>
+      <p:sp>
+        <p:nvSpPr>
+          <p:cNvPr id="3" name="Content Placeholder 2"/>
+          <p:cNvSpPr>
+            <a:spLocks noGrp="1"/>
+          </p:cNvSpPr>
+          <p:nvPr>
+            <p:ph idx="1"/>
+          </p:nvPr>
+        </p:nvSpPr>
+        <p:spPr/>
+        <p:txBody>
+          <a:bodyPr/>
+          <a:lstStyle/>
+          <a:p>
+            <a:r>
+              <a:rPr lang="en-US" dirty="0" smtClean="0">
+                <a:solidFill>
+                  <a:srgbClr val="FF0000"/>
+                </a:solidFill>
+              </a:rPr>
+              <a:t>Indicates how many people opened the Transit app in </a:t>
+            </a:r>
+            <a:r>
+              <a:rPr lang="en-US" altLang="zh-CN" dirty="0" smtClean="0">
+                <a:solidFill>
+                  <a:srgbClr val="FF0000"/>
+                </a:solidFill>
+              </a:rPr>
+              <a:t>each</a:t>
+            </a:r>
+            <a:r>
+              <a:rPr lang="en-US" dirty="0" smtClean="0">
+                <a:solidFill>
+                  <a:srgbClr val="FF0000"/>
+                </a:solidFill>
+              </a:rPr>
+              <a:t> single day;</a:t>
+            </a:r>
+          </a:p>
+          <a:p>
+            <a:r>
+              <a:rPr lang="en-US" dirty="0" smtClean="0"/>
+              <a:t>Using the app is highly correlated with the actual ridership.</a:t>
+            </a:r>
+          </a:p>
+          <a:p>
+            <a:endParaRPr lang="en-US" dirty="0" smtClean="0"/>
+          </a:p>
+          <a:p>
+            <a:r>
+              <a:rPr lang="en-US" dirty="0" smtClean="0"/>
+              <a:t>Mobile </a:t>
+            </a:r>
+            <a:r>
+              <a:rPr lang="en-US" dirty="0"/>
+              <a:t>phone data: public dataset from Transit app;</a:t>
+            </a:r>
+          </a:p>
+          <a:p>
+            <a:r>
+              <a:rPr lang="en-US" dirty="0"/>
+              <a:t>For 113 transit systems in 70 cities in the US, including Columbus and COTA.</a:t>
+            </a:r>
+          </a:p>
+          <a:p>
+            <a:endParaRPr lang="en-US" dirty="0" smtClean="0"/>
+          </a:p>
+        </p:txBody>
+      </p:sp>
+    </p:spTree>
+    <p:extLst>
+      <p:ext uri="{BB962C8B-B14F-4D97-AF65-F5344CB8AC3E}">
+        <p14:creationId xmlns:p14="http://schemas.microsoft.com/office/powerpoint/2010/main" val="3542309161"/>
+      </p:ext>
+    </p:extLst>
+  </p:cSld>
+  <p:clrMapOvr>
+    <a:masterClrMapping/>
+  </p:clrMapOvr>
+</p:sld>
+</file>
+
+<file path=ppt/slides/slide20.xml><?xml version="1.0" encoding="utf-8"?>
 <p:sld xmlns:a="http://schemas.openxmlformats.org/drawingml/2006/main" xmlns:r="http://schemas.openxmlformats.org/officeDocument/2006/relationships" xmlns:p="http://schemas.openxmlformats.org/presentationml/2006/main">
   <p:cSld>
     <p:spTree>
@@ -4205,149 +4591,6 @@
     <p:extLst>
       <p:ext uri="{BB962C8B-B14F-4D97-AF65-F5344CB8AC3E}">
         <p14:creationId xmlns:p14="http://schemas.microsoft.com/office/powerpoint/2010/main" val="342800708"/>
-      </p:ext>
-    </p:extLst>
-  </p:cSld>
-  <p:clrMapOvr>
-    <a:masterClrMapping/>
-  </p:clrMapOvr>
-</p:sld>
-</file>
-
-<file path=ppt/slides/slide2.xml><?xml version="1.0" encoding="utf-8"?>
-<p:sld xmlns:a="http://schemas.openxmlformats.org/drawingml/2006/main" xmlns:r="http://schemas.openxmlformats.org/officeDocument/2006/relationships" xmlns:p="http://schemas.openxmlformats.org/presentationml/2006/main">
-  <p:cSld>
-    <p:spTree>
-      <p:nvGrpSpPr>
-        <p:cNvPr id="1" name=""/>
-        <p:cNvGrpSpPr/>
-        <p:nvPr/>
-      </p:nvGrpSpPr>
-      <p:grpSpPr>
-        <a:xfrm>
-          <a:off x="0" y="0"/>
-          <a:ext cx="0" cy="0"/>
-          <a:chOff x="0" y="0"/>
-          <a:chExt cx="0" cy="0"/>
-        </a:xfrm>
-      </p:grpSpPr>
-      <p:sp>
-        <p:nvSpPr>
-          <p:cNvPr id="2" name="Title 1"/>
-          <p:cNvSpPr>
-            <a:spLocks noGrp="1"/>
-          </p:cNvSpPr>
-          <p:nvPr>
-            <p:ph type="title"/>
-          </p:nvPr>
-        </p:nvSpPr>
-        <p:spPr/>
-        <p:txBody>
-          <a:bodyPr/>
-          <a:lstStyle/>
-          <a:p>
-            <a:r>
-              <a:rPr lang="en-US" dirty="0" smtClean="0"/>
-              <a:t>Data – </a:t>
-            </a:r>
-            <a:r>
-              <a:rPr lang="en-US" dirty="0" smtClean="0">
-                <a:solidFill>
-                  <a:srgbClr val="FF0000"/>
-                </a:solidFill>
-              </a:rPr>
-              <a:t>transit demand</a:t>
-            </a:r>
-            <a:endParaRPr lang="en-US" dirty="0">
-              <a:solidFill>
-                <a:srgbClr val="FF0000"/>
-              </a:solidFill>
-            </a:endParaRPr>
-          </a:p>
-        </p:txBody>
-      </p:sp>
-      <p:sp>
-        <p:nvSpPr>
-          <p:cNvPr id="3" name="Content Placeholder 2"/>
-          <p:cNvSpPr>
-            <a:spLocks noGrp="1"/>
-          </p:cNvSpPr>
-          <p:nvPr>
-            <p:ph idx="1"/>
-          </p:nvPr>
-        </p:nvSpPr>
-        <p:spPr/>
-        <p:txBody>
-          <a:bodyPr/>
-          <a:lstStyle/>
-          <a:p>
-            <a:r>
-              <a:rPr lang="en-US" dirty="0" smtClean="0">
-                <a:solidFill>
-                  <a:srgbClr val="FF0000"/>
-                </a:solidFill>
-              </a:rPr>
-              <a:t>Indicates how many people opened the Transit app in </a:t>
-            </a:r>
-            <a:r>
-              <a:rPr lang="en-US" altLang="zh-CN" dirty="0" smtClean="0">
-                <a:solidFill>
-                  <a:srgbClr val="FF0000"/>
-                </a:solidFill>
-              </a:rPr>
-              <a:t>each</a:t>
-            </a:r>
-            <a:r>
-              <a:rPr lang="en-US" dirty="0" smtClean="0">
-                <a:solidFill>
-                  <a:srgbClr val="FF0000"/>
-                </a:solidFill>
-              </a:rPr>
-              <a:t> </a:t>
-            </a:r>
-            <a:r>
-              <a:rPr lang="en-US" dirty="0" smtClean="0">
-                <a:solidFill>
-                  <a:srgbClr val="FF0000"/>
-                </a:solidFill>
-              </a:rPr>
-              <a:t>single day;</a:t>
-            </a:r>
-          </a:p>
-          <a:p>
-            <a:r>
-              <a:rPr lang="en-US" dirty="0" smtClean="0"/>
-              <a:t>Using the app is highly correlated with the actual ridership.</a:t>
-            </a:r>
-          </a:p>
-          <a:p>
-            <a:endParaRPr lang="en-US" dirty="0" smtClean="0"/>
-          </a:p>
-          <a:p>
-            <a:r>
-              <a:rPr lang="en-US" dirty="0" smtClean="0"/>
-              <a:t>Mobile </a:t>
-            </a:r>
-            <a:r>
-              <a:rPr lang="en-US" dirty="0"/>
-              <a:t>phone data: public dataset from Transit app;</a:t>
-            </a:r>
-          </a:p>
-          <a:p>
-            <a:r>
-              <a:rPr lang="en-US" dirty="0"/>
-              <a:t>For 113 transit systems in 70 cities in the US, including Columbus and COTA.</a:t>
-            </a:r>
-          </a:p>
-          <a:p>
-            <a:endParaRPr lang="en-US" dirty="0" smtClean="0"/>
-          </a:p>
-        </p:txBody>
-      </p:sp>
-    </p:spTree>
-    <p:extLst>
-      <p:ext uri="{BB962C8B-B14F-4D97-AF65-F5344CB8AC3E}">
-        <p14:creationId xmlns:p14="http://schemas.microsoft.com/office/powerpoint/2010/main" val="3542309161"/>
       </p:ext>
     </p:extLst>
   </p:cSld>

</xml_diff>